<commit_message>
weighted avergage of skill similairty
</commit_message>
<xml_diff>
--- a/CS297-2.pptx
+++ b/CS297-2.pptx
@@ -51,6 +51,12 @@
     <p:sldId id="300" r:id="rId45"/>
     <p:sldId id="301" r:id="rId46"/>
     <p:sldId id="302" r:id="rId47"/>
+    <p:sldId id="303" r:id="rId48"/>
+    <p:sldId id="304" r:id="rId49"/>
+    <p:sldId id="305" r:id="rId50"/>
+    <p:sldId id="306" r:id="rId51"/>
+    <p:sldId id="307" r:id="rId52"/>
+    <p:sldId id="308" r:id="rId53"/>
   </p:sldIdLst>
   <p:sldSz cx="12192000" cy="6858000"/>
   <p:notesSz cx="6858000" cy="9144000"/>
@@ -200,6 +206,12 @@
             <p14:sldId id="300"/>
             <p14:sldId id="301"/>
             <p14:sldId id="302"/>
+            <p14:sldId id="303"/>
+            <p14:sldId id="304"/>
+            <p14:sldId id="305"/>
+            <p14:sldId id="306"/>
+            <p14:sldId id="307"/>
+            <p14:sldId id="308"/>
           </p14:sldIdLst>
         </p14:section>
       </p14:sectionLst>
@@ -344,7 +356,7 @@
           <a:p>
             <a:fld id="{D4589B2A-79C4-4840-9D61-9546F1756974}" type="datetimeFigureOut">
               <a:rPr lang="en-US" smtClean="0"/>
-              <a:t>2/4/2018</a:t>
+              <a:t>2/14/2018</a:t>
             </a:fld>
             <a:endParaRPr lang="en-US"/>
           </a:p>
@@ -512,7 +524,7 @@
           <a:p>
             <a:fld id="{D4589B2A-79C4-4840-9D61-9546F1756974}" type="datetimeFigureOut">
               <a:rPr lang="en-US" smtClean="0"/>
-              <a:t>2/4/2018</a:t>
+              <a:t>2/14/2018</a:t>
             </a:fld>
             <a:endParaRPr lang="en-US"/>
           </a:p>
@@ -690,7 +702,7 @@
           <a:p>
             <a:fld id="{D4589B2A-79C4-4840-9D61-9546F1756974}" type="datetimeFigureOut">
               <a:rPr lang="en-US" smtClean="0"/>
-              <a:t>2/4/2018</a:t>
+              <a:t>2/14/2018</a:t>
             </a:fld>
             <a:endParaRPr lang="en-US"/>
           </a:p>
@@ -858,7 +870,7 @@
           <a:p>
             <a:fld id="{D4589B2A-79C4-4840-9D61-9546F1756974}" type="datetimeFigureOut">
               <a:rPr lang="en-US" smtClean="0"/>
-              <a:t>2/4/2018</a:t>
+              <a:t>2/14/2018</a:t>
             </a:fld>
             <a:endParaRPr lang="en-US"/>
           </a:p>
@@ -1103,7 +1115,7 @@
           <a:p>
             <a:fld id="{D4589B2A-79C4-4840-9D61-9546F1756974}" type="datetimeFigureOut">
               <a:rPr lang="en-US" smtClean="0"/>
-              <a:t>2/4/2018</a:t>
+              <a:t>2/14/2018</a:t>
             </a:fld>
             <a:endParaRPr lang="en-US"/>
           </a:p>
@@ -1332,7 +1344,7 @@
           <a:p>
             <a:fld id="{D4589B2A-79C4-4840-9D61-9546F1756974}" type="datetimeFigureOut">
               <a:rPr lang="en-US" smtClean="0"/>
-              <a:t>2/4/2018</a:t>
+              <a:t>2/14/2018</a:t>
             </a:fld>
             <a:endParaRPr lang="en-US"/>
           </a:p>
@@ -1696,7 +1708,7 @@
           <a:p>
             <a:fld id="{D4589B2A-79C4-4840-9D61-9546F1756974}" type="datetimeFigureOut">
               <a:rPr lang="en-US" smtClean="0"/>
-              <a:t>2/4/2018</a:t>
+              <a:t>2/14/2018</a:t>
             </a:fld>
             <a:endParaRPr lang="en-US"/>
           </a:p>
@@ -1813,7 +1825,7 @@
           <a:p>
             <a:fld id="{D4589B2A-79C4-4840-9D61-9546F1756974}" type="datetimeFigureOut">
               <a:rPr lang="en-US" smtClean="0"/>
-              <a:t>2/4/2018</a:t>
+              <a:t>2/14/2018</a:t>
             </a:fld>
             <a:endParaRPr lang="en-US"/>
           </a:p>
@@ -1908,7 +1920,7 @@
           <a:p>
             <a:fld id="{D4589B2A-79C4-4840-9D61-9546F1756974}" type="datetimeFigureOut">
               <a:rPr lang="en-US" smtClean="0"/>
-              <a:t>2/4/2018</a:t>
+              <a:t>2/14/2018</a:t>
             </a:fld>
             <a:endParaRPr lang="en-US"/>
           </a:p>
@@ -2183,7 +2195,7 @@
           <a:p>
             <a:fld id="{D4589B2A-79C4-4840-9D61-9546F1756974}" type="datetimeFigureOut">
               <a:rPr lang="en-US" smtClean="0"/>
-              <a:t>2/4/2018</a:t>
+              <a:t>2/14/2018</a:t>
             </a:fld>
             <a:endParaRPr lang="en-US"/>
           </a:p>
@@ -2435,7 +2447,7 @@
           <a:p>
             <a:fld id="{D4589B2A-79C4-4840-9D61-9546F1756974}" type="datetimeFigureOut">
               <a:rPr lang="en-US" smtClean="0"/>
-              <a:t>2/4/2018</a:t>
+              <a:t>2/14/2018</a:t>
             </a:fld>
             <a:endParaRPr lang="en-US"/>
           </a:p>
@@ -2646,7 +2658,7 @@
           <a:p>
             <a:fld id="{D4589B2A-79C4-4840-9D61-9546F1756974}" type="datetimeFigureOut">
               <a:rPr lang="en-US" smtClean="0"/>
-              <a:t>2/4/2018</a:t>
+              <a:t>2/14/2018</a:t>
             </a:fld>
             <a:endParaRPr lang="en-US"/>
           </a:p>
@@ -14148,10 +14160,6 @@
               </a:rPr>
               <a:t>', 'Computer Programming'}</a:t>
             </a:r>
-            <a:endParaRPr lang="en-US" sz="2100" dirty="0">
-              <a:latin typeface="Consolas" panose="020B0609020204030204" pitchFamily="49" charset="0"/>
-              <a:cs typeface="Consolas" panose="020B0609020204030204" pitchFamily="49" charset="0"/>
-            </a:endParaRPr>
           </a:p>
         </p:txBody>
       </p:sp>
@@ -14722,11 +14730,7 @@
             </a:pPr>
             <a:r>
               <a:rPr lang="en-US" sz="2400" dirty="0"/>
-              <a:t>While doing this found a bug in the ontology. </a:t>
-            </a:r>
-            <a:r>
-              <a:rPr lang="en-US" sz="2400" dirty="0"/>
-              <a:t>Few links were missing and which also caused for the smaller values of similarity </a:t>
+              <a:t>While doing this found a bug in the ontology. Few links were missing and which also caused for the smaller values of similarity </a:t>
             </a:r>
             <a:r>
               <a:rPr lang="en-US" sz="2400" dirty="0" smtClean="0"/>
@@ -14749,7 +14753,6 @@
               <a:rPr lang="en-US" sz="2400" dirty="0"/>
               <a:t>Corrected the bug and reran the ontology crawler. Loaded partial skills.</a:t>
             </a:r>
-            <a:endParaRPr lang="en-US" sz="2400" dirty="0"/>
           </a:p>
         </p:txBody>
       </p:sp>
@@ -14791,6 +14794,697 @@
   <p:clrMapOvr>
     <a:masterClrMapping/>
   </p:clrMapOvr>
+</p:sld>
+</file>
+
+<file path=ppt/slides/slide47.xml><?xml version="1.0" encoding="utf-8"?>
+<p:sld xmlns:a="http://schemas.openxmlformats.org/drawingml/2006/main" xmlns:r="http://schemas.openxmlformats.org/officeDocument/2006/relationships" xmlns:p="http://schemas.openxmlformats.org/presentationml/2006/main">
+  <p:cSld>
+    <p:spTree>
+      <p:nvGrpSpPr>
+        <p:cNvPr id="1" name=""/>
+        <p:cNvGrpSpPr/>
+        <p:nvPr/>
+      </p:nvGrpSpPr>
+      <p:grpSpPr>
+        <a:xfrm>
+          <a:off x="0" y="0"/>
+          <a:ext cx="0" cy="0"/>
+          <a:chOff x="0" y="0"/>
+          <a:chExt cx="0" cy="0"/>
+        </a:xfrm>
+      </p:grpSpPr>
+      <p:sp>
+        <p:nvSpPr>
+          <p:cNvPr id="2" name="Title 1"/>
+          <p:cNvSpPr>
+            <a:spLocks noGrp="1"/>
+          </p:cNvSpPr>
+          <p:nvPr>
+            <p:ph type="title"/>
+          </p:nvPr>
+        </p:nvSpPr>
+        <p:spPr/>
+        <p:txBody>
+          <a:bodyPr/>
+          <a:lstStyle/>
+          <a:p>
+            <a:r>
+              <a:rPr lang="en-US" dirty="0" smtClean="0"/>
+              <a:t>Progress</a:t>
+            </a:r>
+            <a:endParaRPr lang="en-US" dirty="0"/>
+          </a:p>
+        </p:txBody>
+      </p:sp>
+      <p:sp>
+        <p:nvSpPr>
+          <p:cNvPr id="3" name="Content Placeholder 2"/>
+          <p:cNvSpPr>
+            <a:spLocks noGrp="1"/>
+          </p:cNvSpPr>
+          <p:nvPr>
+            <p:ph idx="1"/>
+          </p:nvPr>
+        </p:nvSpPr>
+        <p:spPr/>
+        <p:txBody>
+          <a:bodyPr/>
+          <a:lstStyle/>
+          <a:p>
+            <a:r>
+              <a:rPr lang="en-US" dirty="0" smtClean="0"/>
+              <a:t>Crawled ontology for the following root concepts</a:t>
+            </a:r>
+          </a:p>
+          <a:p>
+            <a:pPr lvl="1"/>
+            <a:r>
+              <a:rPr lang="en-US" dirty="0"/>
+              <a:t>Computer Programming</a:t>
+            </a:r>
+          </a:p>
+          <a:p>
+            <a:pPr lvl="1"/>
+            <a:r>
+              <a:rPr lang="en-US" dirty="0"/>
+              <a:t>Databases</a:t>
+            </a:r>
+          </a:p>
+          <a:p>
+            <a:pPr lvl="1"/>
+            <a:r>
+              <a:rPr lang="en-US" dirty="0"/>
+              <a:t>Machine learning</a:t>
+            </a:r>
+          </a:p>
+          <a:p>
+            <a:pPr lvl="1"/>
+            <a:r>
+              <a:rPr lang="en-US" dirty="0"/>
+              <a:t>Web </a:t>
+            </a:r>
+            <a:r>
+              <a:rPr lang="en-US" dirty="0" smtClean="0"/>
+              <a:t>Development</a:t>
+            </a:r>
+          </a:p>
+          <a:p>
+            <a:pPr marL="228600" lvl="1">
+              <a:spcBef>
+                <a:spcPts val="1000"/>
+              </a:spcBef>
+            </a:pPr>
+            <a:r>
+              <a:rPr lang="en-US" dirty="0"/>
+              <a:t>Loaded around 9000 skills into the </a:t>
+            </a:r>
+            <a:r>
+              <a:rPr lang="en-US" dirty="0" smtClean="0"/>
+              <a:t>ontology</a:t>
+            </a:r>
+          </a:p>
+          <a:p>
+            <a:pPr marL="228600" lvl="1">
+              <a:spcBef>
+                <a:spcPts val="1000"/>
+              </a:spcBef>
+            </a:pPr>
+            <a:r>
+              <a:rPr lang="en-US" dirty="0" smtClean="0"/>
+              <a:t>Implemented the similarity and dissimilarity measure for a set of skills and set of requirements.</a:t>
+            </a:r>
+          </a:p>
+        </p:txBody>
+      </p:sp>
+    </p:spTree>
+    <p:extLst>
+      <p:ext uri="{BB962C8B-B14F-4D97-AF65-F5344CB8AC3E}">
+        <p14:creationId xmlns:p14="http://schemas.microsoft.com/office/powerpoint/2010/main" val="2799540286"/>
+      </p:ext>
+    </p:extLst>
+  </p:cSld>
+  <p:clrMapOvr>
+    <a:masterClrMapping/>
+  </p:clrMapOvr>
+  <p:timing>
+    <p:tnLst>
+      <p:par>
+        <p:cTn id="1" dur="indefinite" restart="never" nodeType="tmRoot"/>
+      </p:par>
+    </p:tnLst>
+  </p:timing>
+</p:sld>
+</file>
+
+<file path=ppt/slides/slide48.xml><?xml version="1.0" encoding="utf-8"?>
+<p:sld xmlns:a="http://schemas.openxmlformats.org/drawingml/2006/main" xmlns:r="http://schemas.openxmlformats.org/officeDocument/2006/relationships" xmlns:p="http://schemas.openxmlformats.org/presentationml/2006/main">
+  <p:cSld>
+    <p:spTree>
+      <p:nvGrpSpPr>
+        <p:cNvPr id="1" name=""/>
+        <p:cNvGrpSpPr/>
+        <p:nvPr/>
+      </p:nvGrpSpPr>
+      <p:grpSpPr>
+        <a:xfrm>
+          <a:off x="0" y="0"/>
+          <a:ext cx="0" cy="0"/>
+          <a:chOff x="0" y="0"/>
+          <a:chExt cx="0" cy="0"/>
+        </a:xfrm>
+      </p:grpSpPr>
+      <p:sp>
+        <p:nvSpPr>
+          <p:cNvPr id="2" name="Title 1"/>
+          <p:cNvSpPr>
+            <a:spLocks noGrp="1"/>
+          </p:cNvSpPr>
+          <p:nvPr>
+            <p:ph type="title"/>
+          </p:nvPr>
+        </p:nvSpPr>
+        <p:spPr/>
+        <p:txBody>
+          <a:bodyPr/>
+          <a:lstStyle/>
+          <a:p>
+            <a:r>
+              <a:rPr lang="en-US" dirty="0" smtClean="0"/>
+              <a:t>Dissimilarity measure</a:t>
+            </a:r>
+            <a:endParaRPr lang="en-US" dirty="0"/>
+          </a:p>
+        </p:txBody>
+      </p:sp>
+      <mc:AlternateContent xmlns:mc="http://schemas.openxmlformats.org/markup-compatibility/2006">
+        <mc:Choice xmlns:a14="http://schemas.microsoft.com/office/drawing/2010/main" Requires="a14">
+          <p:sp>
+            <p:nvSpPr>
+              <p:cNvPr id="3" name="Content Placeholder 2"/>
+              <p:cNvSpPr>
+                <a:spLocks noGrp="1"/>
+              </p:cNvSpPr>
+              <p:nvPr>
+                <p:ph idx="1"/>
+              </p:nvPr>
+            </p:nvSpPr>
+            <p:spPr/>
+            <p:txBody>
+              <a:bodyPr>
+                <a:normAutofit fontScale="92500" lnSpcReduction="10000"/>
+              </a:bodyPr>
+              <a:lstStyle/>
+              <a:p>
+                <a:r>
+                  <a:rPr lang="en-US" dirty="0" smtClean="0"/>
+                  <a:t>Sanchez distance</a:t>
+                </a:r>
+              </a:p>
+              <a:p>
+                <a:endParaRPr lang="en-US" dirty="0" smtClean="0"/>
+              </a:p>
+              <a:p>
+                <a:r>
+                  <a:rPr lang="en-US" dirty="0" smtClean="0"/>
+                  <a:t>Rodriguez similarity</a:t>
+                </a:r>
+              </a:p>
+              <a:p>
+                <a:pPr marL="0" indent="0">
+                  <a:buNone/>
+                </a:pPr>
+                <a:r>
+                  <a:rPr lang="en-US" sz="1800" dirty="0" smtClean="0"/>
+                  <a:t>	where </a:t>
+                </a:r>
+                <a14:m>
+                  <m:oMath xmlns:m="http://schemas.openxmlformats.org/officeDocument/2006/math">
+                    <m:r>
+                      <a:rPr lang="en-US" sz="1800" i="1" smtClean="0">
+                        <a:latin typeface="Cambria Math" panose="02040503050406030204" pitchFamily="18" charset="0"/>
+                        <a:ea typeface="Cambria Math" panose="02040503050406030204" pitchFamily="18" charset="0"/>
+                      </a:rPr>
+                      <m:t>𝛾</m:t>
+                    </m:r>
+                    <m:r>
+                      <a:rPr lang="en-US" sz="1800" b="0" i="1" smtClean="0">
+                        <a:latin typeface="Cambria Math" panose="02040503050406030204" pitchFamily="18" charset="0"/>
+                        <a:ea typeface="Cambria Math" panose="02040503050406030204" pitchFamily="18" charset="0"/>
+                      </a:rPr>
+                      <m:t>=</m:t>
+                    </m:r>
+                    <m:r>
+                      <a:rPr lang="en-US" sz="1800" b="0" i="1" smtClean="0">
+                        <a:latin typeface="Cambria Math" panose="02040503050406030204" pitchFamily="18" charset="0"/>
+                        <a:ea typeface="Cambria Math" panose="02040503050406030204" pitchFamily="18" charset="0"/>
+                      </a:rPr>
+                      <m:t>𝑟𝑎𝑡𝑖𝑜</m:t>
+                    </m:r>
+                    <m:r>
+                      <a:rPr lang="en-US" sz="1800" b="0" i="1" smtClean="0">
+                        <a:latin typeface="Cambria Math" panose="02040503050406030204" pitchFamily="18" charset="0"/>
+                        <a:ea typeface="Cambria Math" panose="02040503050406030204" pitchFamily="18" charset="0"/>
+                      </a:rPr>
+                      <m:t> </m:t>
+                    </m:r>
+                    <m:r>
+                      <a:rPr lang="en-US" sz="1800" b="0" i="1" smtClean="0">
+                        <a:latin typeface="Cambria Math" panose="02040503050406030204" pitchFamily="18" charset="0"/>
+                        <a:ea typeface="Cambria Math" panose="02040503050406030204" pitchFamily="18" charset="0"/>
+                      </a:rPr>
+                      <m:t>𝑜𝑓</m:t>
+                    </m:r>
+                    <m:r>
+                      <a:rPr lang="en-US" sz="1800" b="0" i="1" smtClean="0">
+                        <a:latin typeface="Cambria Math" panose="02040503050406030204" pitchFamily="18" charset="0"/>
+                        <a:ea typeface="Cambria Math" panose="02040503050406030204" pitchFamily="18" charset="0"/>
+                      </a:rPr>
+                      <m:t> </m:t>
+                    </m:r>
+                    <m:r>
+                      <a:rPr lang="en-US" sz="1800" b="0" i="1" smtClean="0">
+                        <a:latin typeface="Cambria Math" panose="02040503050406030204" pitchFamily="18" charset="0"/>
+                        <a:ea typeface="Cambria Math" panose="02040503050406030204" pitchFamily="18" charset="0"/>
+                      </a:rPr>
+                      <m:t>𝑑𝑖𝑠𝑠𝑖𝑚𝑖𝑙𝑎𝑟𝑖𝑡𝑦</m:t>
+                    </m:r>
+                    <m:r>
+                      <a:rPr lang="en-US" sz="1800" b="0" i="1" smtClean="0">
+                        <a:latin typeface="Cambria Math" panose="02040503050406030204" pitchFamily="18" charset="0"/>
+                        <a:ea typeface="Cambria Math" panose="02040503050406030204" pitchFamily="18" charset="0"/>
+                      </a:rPr>
+                      <m:t> </m:t>
+                    </m:r>
+                    <m:r>
+                      <a:rPr lang="en-US" sz="1800" b="0" i="1" smtClean="0">
+                        <a:latin typeface="Cambria Math" panose="02040503050406030204" pitchFamily="18" charset="0"/>
+                        <a:ea typeface="Cambria Math" panose="02040503050406030204" pitchFamily="18" charset="0"/>
+                      </a:rPr>
+                      <m:t>𝑜𝑓</m:t>
+                    </m:r>
+                    <m:r>
+                      <a:rPr lang="en-US" sz="1800" b="0" i="1" smtClean="0">
+                        <a:latin typeface="Cambria Math" panose="02040503050406030204" pitchFamily="18" charset="0"/>
+                        <a:ea typeface="Cambria Math" panose="02040503050406030204" pitchFamily="18" charset="0"/>
+                      </a:rPr>
+                      <m:t> </m:t>
+                    </m:r>
+                    <m:r>
+                      <a:rPr lang="en-US" sz="1800" b="0" i="1" smtClean="0">
+                        <a:latin typeface="Cambria Math" panose="02040503050406030204" pitchFamily="18" charset="0"/>
+                        <a:ea typeface="Cambria Math" panose="02040503050406030204" pitchFamily="18" charset="0"/>
+                      </a:rPr>
+                      <m:t>𝑎</m:t>
+                    </m:r>
+                    <m:r>
+                      <a:rPr lang="en-US" sz="1800" b="0" i="1" smtClean="0">
+                        <a:latin typeface="Cambria Math" panose="02040503050406030204" pitchFamily="18" charset="0"/>
+                        <a:ea typeface="Cambria Math" panose="02040503050406030204" pitchFamily="18" charset="0"/>
+                      </a:rPr>
+                      <m:t> </m:t>
+                    </m:r>
+                    <m:r>
+                      <a:rPr lang="en-US" sz="1800" b="0" i="1" smtClean="0">
+                        <a:latin typeface="Cambria Math" panose="02040503050406030204" pitchFamily="18" charset="0"/>
+                        <a:ea typeface="Cambria Math" panose="02040503050406030204" pitchFamily="18" charset="0"/>
+                      </a:rPr>
+                      <m:t>𝑠𝑘𝑖𝑙𝑙</m:t>
+                    </m:r>
+                    <m:r>
+                      <a:rPr lang="en-US" sz="1800" b="0" i="1" smtClean="0">
+                        <a:latin typeface="Cambria Math" panose="02040503050406030204" pitchFamily="18" charset="0"/>
+                        <a:ea typeface="Cambria Math" panose="02040503050406030204" pitchFamily="18" charset="0"/>
+                      </a:rPr>
+                      <m:t> </m:t>
+                    </m:r>
+                    <m:r>
+                      <a:rPr lang="en-US" sz="1800" b="0" i="1" smtClean="0">
+                        <a:latin typeface="Cambria Math" panose="02040503050406030204" pitchFamily="18" charset="0"/>
+                        <a:ea typeface="Cambria Math" panose="02040503050406030204" pitchFamily="18" charset="0"/>
+                      </a:rPr>
+                      <m:t>𝑡𝑜</m:t>
+                    </m:r>
+                    <m:r>
+                      <a:rPr lang="en-US" sz="1800" b="0" i="1" smtClean="0">
+                        <a:latin typeface="Cambria Math" panose="02040503050406030204" pitchFamily="18" charset="0"/>
+                        <a:ea typeface="Cambria Math" panose="02040503050406030204" pitchFamily="18" charset="0"/>
+                      </a:rPr>
+                      <m:t> </m:t>
+                    </m:r>
+                    <m:r>
+                      <a:rPr lang="en-US" sz="1800" b="0" i="1" smtClean="0">
+                        <a:latin typeface="Cambria Math" panose="02040503050406030204" pitchFamily="18" charset="0"/>
+                        <a:ea typeface="Cambria Math" panose="02040503050406030204" pitchFamily="18" charset="0"/>
+                      </a:rPr>
+                      <m:t>𝑡𝑜𝑡𝑎𝑙</m:t>
+                    </m:r>
+                    <m:r>
+                      <a:rPr lang="en-US" sz="1800" b="0" i="1" smtClean="0">
+                        <a:latin typeface="Cambria Math" panose="02040503050406030204" pitchFamily="18" charset="0"/>
+                        <a:ea typeface="Cambria Math" panose="02040503050406030204" pitchFamily="18" charset="0"/>
+                      </a:rPr>
+                      <m:t> </m:t>
+                    </m:r>
+                    <m:r>
+                      <a:rPr lang="en-US" sz="1800" b="0" i="1" smtClean="0">
+                        <a:latin typeface="Cambria Math" panose="02040503050406030204" pitchFamily="18" charset="0"/>
+                        <a:ea typeface="Cambria Math" panose="02040503050406030204" pitchFamily="18" charset="0"/>
+                      </a:rPr>
+                      <m:t>𝑑𝑖𝑠𝑠𝑖𝑚𝑖𝑙𝑎𝑟𝑖𝑡𝑦</m:t>
+                    </m:r>
+                    <m:r>
+                      <a:rPr lang="en-US" sz="1800" b="0" i="1" smtClean="0">
+                        <a:latin typeface="Cambria Math" panose="02040503050406030204" pitchFamily="18" charset="0"/>
+                        <a:ea typeface="Cambria Math" panose="02040503050406030204" pitchFamily="18" charset="0"/>
+                      </a:rPr>
+                      <m:t> </m:t>
+                    </m:r>
+                  </m:oMath>
+                </a14:m>
+                <a:endParaRPr lang="en-US" sz="1800" b="0" dirty="0" smtClean="0">
+                  <a:ea typeface="Cambria Math" panose="02040503050406030204" pitchFamily="18" charset="0"/>
+                </a:endParaRPr>
+              </a:p>
+              <a:p>
+                <a:pPr marL="0" indent="0">
+                  <a:buNone/>
+                </a:pPr>
+                <a:endParaRPr lang="en-US" sz="1800" dirty="0" smtClean="0"/>
+              </a:p>
+              <a:p>
+                <a:pPr marL="0" indent="0">
+                  <a:buNone/>
+                </a:pPr>
+                <a:r>
+                  <a:rPr lang="en-US" sz="1800" dirty="0" smtClean="0"/>
+                  <a:t>Compared the below two sets </a:t>
+                </a:r>
+              </a:p>
+              <a:p>
+                <a:pPr marL="0" indent="0">
+                  <a:buNone/>
+                </a:pPr>
+                <a:r>
+                  <a:rPr lang="en-US" sz="1800" b="1" dirty="0" smtClean="0"/>
+                  <a:t>From Resume : </a:t>
+                </a:r>
+              </a:p>
+              <a:p>
+                <a:pPr marL="0" indent="0">
+                  <a:lnSpc>
+                    <a:spcPct val="110000"/>
+                  </a:lnSpc>
+                  <a:buNone/>
+                </a:pPr>
+                <a:r>
+                  <a:rPr lang="en-US" sz="1400" dirty="0">
+                    <a:latin typeface="Consolas" panose="020B0609020204030204" pitchFamily="49" charset="0"/>
+                    <a:cs typeface="Consolas" panose="020B0609020204030204" pitchFamily="49" charset="0"/>
+                  </a:rPr>
+                  <a:t>"</a:t>
+                </a:r>
+                <a:r>
+                  <a:rPr lang="en-US" sz="1400" dirty="0" err="1">
+                    <a:latin typeface="Consolas" panose="020B0609020204030204" pitchFamily="49" charset="0"/>
+                    <a:cs typeface="Consolas" panose="020B0609020204030204" pitchFamily="49" charset="0"/>
+                  </a:rPr>
+                  <a:t>Java","Python","C","REST","SOAP","HTML","JavaScript</a:t>
+                </a:r>
+                <a:r>
+                  <a:rPr lang="en-US" sz="1400" dirty="0">
+                    <a:latin typeface="Consolas" panose="020B0609020204030204" pitchFamily="49" charset="0"/>
+                    <a:cs typeface="Consolas" panose="020B0609020204030204" pitchFamily="49" charset="0"/>
+                  </a:rPr>
+                  <a:t>"," node.js","artificial_Neural_networks","hidden_markov_models","TensorFlow","scikit-learn","Oracle_Database","MySQL","MongoDB","Apache_Hadoop","Apache_Spark","Apache_Kafka","ElasticSearch","Kibana","Spring_Frameworks","Django","Flask","Apache_Maven","Subversion","GIT","Eclipse","Rational_ClearCase"</a:t>
+                </a:r>
+              </a:p>
+              <a:p>
+                <a:pPr marL="0" indent="0">
+                  <a:buNone/>
+                </a:pPr>
+                <a:r>
+                  <a:rPr lang="en-US" sz="1800" b="1" dirty="0"/>
+                  <a:t>From Job Description : </a:t>
+                </a:r>
+                <a:endParaRPr lang="en-US" sz="1800" b="1" dirty="0" smtClean="0"/>
+              </a:p>
+              <a:p>
+                <a:pPr marL="0" indent="0">
+                  <a:lnSpc>
+                    <a:spcPct val="110000"/>
+                  </a:lnSpc>
+                  <a:buNone/>
+                </a:pPr>
+                <a:r>
+                  <a:rPr lang="en-US" sz="1400" dirty="0">
+                    <a:latin typeface="Consolas" panose="020B0609020204030204" pitchFamily="49" charset="0"/>
+                    <a:cs typeface="Consolas" panose="020B0609020204030204" pitchFamily="49" charset="0"/>
+                  </a:rPr>
+                  <a:t>C</a:t>
+                </a:r>
+                <a:r>
+                  <a:rPr lang="en-US" sz="1400" dirty="0">
+                    <a:latin typeface="Consolas" panose="020B0609020204030204" pitchFamily="49" charset="0"/>
+                    <a:cs typeface="Consolas" panose="020B0609020204030204" pitchFamily="49" charset="0"/>
+                  </a:rPr>
+                  <a:t>++","</a:t>
+                </a:r>
+                <a:r>
+                  <a:rPr lang="en-US" sz="1400" dirty="0" err="1">
+                    <a:latin typeface="Consolas" panose="020B0609020204030204" pitchFamily="49" charset="0"/>
+                    <a:cs typeface="Consolas" panose="020B0609020204030204" pitchFamily="49" charset="0"/>
+                  </a:rPr>
+                  <a:t>Java","C</a:t>
+                </a:r>
+                <a:r>
+                  <a:rPr lang="en-US" sz="1400" dirty="0">
+                    <a:latin typeface="Consolas" panose="020B0609020204030204" pitchFamily="49" charset="0"/>
+                    <a:cs typeface="Consolas" panose="020B0609020204030204" pitchFamily="49" charset="0"/>
+                  </a:rPr>
+                  <a:t># ","MYSQL","</a:t>
+                </a:r>
+                <a:r>
+                  <a:rPr lang="en-US" sz="1400" dirty="0" err="1">
+                    <a:latin typeface="Consolas" panose="020B0609020204030204" pitchFamily="49" charset="0"/>
+                    <a:cs typeface="Consolas" panose="020B0609020204030204" pitchFamily="49" charset="0"/>
+                  </a:rPr>
+                  <a:t>Memcached</a:t>
+                </a:r>
+                <a:r>
+                  <a:rPr lang="en-US" sz="1400" dirty="0">
+                    <a:latin typeface="Consolas" panose="020B0609020204030204" pitchFamily="49" charset="0"/>
+                    <a:cs typeface="Consolas" panose="020B0609020204030204" pitchFamily="49" charset="0"/>
+                  </a:rPr>
+                  <a:t>","</a:t>
+                </a:r>
+                <a:r>
+                  <a:rPr lang="en-US" sz="1400" dirty="0" err="1">
+                    <a:latin typeface="Consolas" panose="020B0609020204030204" pitchFamily="49" charset="0"/>
+                    <a:cs typeface="Consolas" panose="020B0609020204030204" pitchFamily="49" charset="0"/>
+                  </a:rPr>
+                  <a:t>Apache_Hadoop","Apache_Hive","NoSQL</a:t>
+                </a:r>
+                <a:r>
+                  <a:rPr lang="en-US" sz="1400" dirty="0">
+                    <a:latin typeface="Consolas" panose="020B0609020204030204" pitchFamily="49" charset="0"/>
+                    <a:cs typeface="Consolas" panose="020B0609020204030204" pitchFamily="49" charset="0"/>
+                  </a:rPr>
+                  <a:t>","</a:t>
+                </a:r>
+              </a:p>
+              <a:p>
+                <a:pPr marL="0" indent="0">
+                  <a:buNone/>
+                </a:pPr>
+                <a:endParaRPr lang="en-US" sz="1800" dirty="0"/>
+              </a:p>
+            </p:txBody>
+          </p:sp>
+        </mc:Choice>
+        <mc:Fallback>
+          <p:sp>
+            <p:nvSpPr>
+              <p:cNvPr id="3" name="Content Placeholder 2"/>
+              <p:cNvSpPr>
+                <a:spLocks noGrp="1" noRot="1" noChangeAspect="1" noMove="1" noResize="1" noEditPoints="1" noAdjustHandles="1" noChangeArrowheads="1" noChangeShapeType="1" noTextEdit="1"/>
+              </p:cNvSpPr>
+              <p:nvPr>
+                <p:ph idx="1"/>
+              </p:nvPr>
+            </p:nvSpPr>
+            <p:spPr>
+              <a:blipFill>
+                <a:blip r:embed="rId2"/>
+                <a:stretch>
+                  <a:fillRect l="-928" t="-2801"/>
+                </a:stretch>
+              </a:blipFill>
+            </p:spPr>
+            <p:txBody>
+              <a:bodyPr/>
+              <a:lstStyle/>
+              <a:p>
+                <a:r>
+                  <a:rPr lang="en-US">
+                    <a:noFill/>
+                  </a:rPr>
+                  <a:t> </a:t>
+                </a:r>
+              </a:p>
+            </p:txBody>
+          </p:sp>
+        </mc:Fallback>
+      </mc:AlternateContent>
+      <p:pic>
+        <p:nvPicPr>
+          <p:cNvPr id="4" name="Picture 3"/>
+          <p:cNvPicPr>
+            <a:picLocks noChangeAspect="1"/>
+          </p:cNvPicPr>
+          <p:nvPr/>
+        </p:nvPicPr>
+        <p:blipFill>
+          <a:blip r:embed="rId3"/>
+          <a:stretch>
+            <a:fillRect/>
+          </a:stretch>
+        </p:blipFill>
+        <p:spPr>
+          <a:xfrm>
+            <a:off x="4160250" y="1537206"/>
+            <a:ext cx="6868486" cy="1280272"/>
+          </a:xfrm>
+          <a:prstGeom prst="rect">
+            <a:avLst/>
+          </a:prstGeom>
+        </p:spPr>
+      </p:pic>
+      <p:pic>
+        <p:nvPicPr>
+          <p:cNvPr id="5" name="Picture 4"/>
+          <p:cNvPicPr>
+            <a:picLocks noChangeAspect="1"/>
+          </p:cNvPicPr>
+          <p:nvPr/>
+        </p:nvPicPr>
+        <p:blipFill>
+          <a:blip r:embed="rId4"/>
+          <a:stretch>
+            <a:fillRect/>
+          </a:stretch>
+        </p:blipFill>
+        <p:spPr>
+          <a:xfrm>
+            <a:off x="4160250" y="2647014"/>
+            <a:ext cx="5173134" cy="754743"/>
+          </a:xfrm>
+          <a:prstGeom prst="rect">
+            <a:avLst/>
+          </a:prstGeom>
+        </p:spPr>
+      </p:pic>
+    </p:spTree>
+    <p:extLst>
+      <p:ext uri="{BB962C8B-B14F-4D97-AF65-F5344CB8AC3E}">
+        <p14:creationId xmlns:p14="http://schemas.microsoft.com/office/powerpoint/2010/main" val="2375580241"/>
+      </p:ext>
+    </p:extLst>
+  </p:cSld>
+  <p:clrMapOvr>
+    <a:masterClrMapping/>
+  </p:clrMapOvr>
+  <p:timing>
+    <p:tnLst>
+      <p:par>
+        <p:cTn id="1" dur="indefinite" restart="never" nodeType="tmRoot"/>
+      </p:par>
+    </p:tnLst>
+  </p:timing>
+</p:sld>
+</file>
+
+<file path=ppt/slides/slide49.xml><?xml version="1.0" encoding="utf-8"?>
+<p:sld xmlns:a="http://schemas.openxmlformats.org/drawingml/2006/main" xmlns:r="http://schemas.openxmlformats.org/officeDocument/2006/relationships" xmlns:p="http://schemas.openxmlformats.org/presentationml/2006/main">
+  <p:cSld>
+    <p:spTree>
+      <p:nvGrpSpPr>
+        <p:cNvPr id="1" name=""/>
+        <p:cNvGrpSpPr/>
+        <p:nvPr/>
+      </p:nvGrpSpPr>
+      <p:grpSpPr>
+        <a:xfrm>
+          <a:off x="0" y="0"/>
+          <a:ext cx="0" cy="0"/>
+          <a:chOff x="0" y="0"/>
+          <a:chExt cx="0" cy="0"/>
+        </a:xfrm>
+      </p:grpSpPr>
+      <p:pic>
+        <p:nvPicPr>
+          <p:cNvPr id="4" name="Picture 3"/>
+          <p:cNvPicPr>
+            <a:picLocks noChangeAspect="1"/>
+          </p:cNvPicPr>
+          <p:nvPr/>
+        </p:nvPicPr>
+        <p:blipFill>
+          <a:blip r:embed="rId2"/>
+          <a:stretch>
+            <a:fillRect/>
+          </a:stretch>
+        </p:blipFill>
+        <p:spPr>
+          <a:xfrm>
+            <a:off x="1331259" y="1825624"/>
+            <a:ext cx="8646458" cy="4099317"/>
+          </a:xfrm>
+          <a:prstGeom prst="rect">
+            <a:avLst/>
+          </a:prstGeom>
+        </p:spPr>
+      </p:pic>
+      <p:sp>
+        <p:nvSpPr>
+          <p:cNvPr id="2" name="Title 1"/>
+          <p:cNvSpPr>
+            <a:spLocks noGrp="1"/>
+          </p:cNvSpPr>
+          <p:nvPr>
+            <p:ph type="title"/>
+          </p:nvPr>
+        </p:nvSpPr>
+        <p:spPr/>
+        <p:txBody>
+          <a:bodyPr/>
+          <a:lstStyle/>
+          <a:p>
+            <a:r>
+              <a:rPr lang="en-US" dirty="0" smtClean="0"/>
+              <a:t>C++ and resume skills</a:t>
+            </a:r>
+            <a:endParaRPr lang="en-US" dirty="0"/>
+          </a:p>
+        </p:txBody>
+      </p:sp>
+    </p:spTree>
+    <p:extLst>
+      <p:ext uri="{BB962C8B-B14F-4D97-AF65-F5344CB8AC3E}">
+        <p14:creationId xmlns:p14="http://schemas.microsoft.com/office/powerpoint/2010/main" val="3010930613"/>
+      </p:ext>
+    </p:extLst>
+  </p:cSld>
+  <p:clrMapOvr>
+    <a:masterClrMapping/>
+  </p:clrMapOvr>
+  <p:timing>
+    <p:tnLst>
+      <p:par>
+        <p:cTn id="1" dur="indefinite" restart="never" nodeType="tmRoot"/>
+      </p:par>
+    </p:tnLst>
+  </p:timing>
 </p:sld>
 </file>
 
@@ -15136,6 +15830,290 @@
 </p:sld>
 </file>
 
+<file path=ppt/slides/slide50.xml><?xml version="1.0" encoding="utf-8"?>
+<p:sld xmlns:a="http://schemas.openxmlformats.org/drawingml/2006/main" xmlns:r="http://schemas.openxmlformats.org/officeDocument/2006/relationships" xmlns:p="http://schemas.openxmlformats.org/presentationml/2006/main">
+  <p:cSld>
+    <p:spTree>
+      <p:nvGrpSpPr>
+        <p:cNvPr id="1" name=""/>
+        <p:cNvGrpSpPr/>
+        <p:nvPr/>
+      </p:nvGrpSpPr>
+      <p:grpSpPr>
+        <a:xfrm>
+          <a:off x="0" y="0"/>
+          <a:ext cx="0" cy="0"/>
+          <a:chOff x="0" y="0"/>
+          <a:chExt cx="0" cy="0"/>
+        </a:xfrm>
+      </p:grpSpPr>
+      <p:sp>
+        <p:nvSpPr>
+          <p:cNvPr id="2" name="Title 1"/>
+          <p:cNvSpPr>
+            <a:spLocks noGrp="1"/>
+          </p:cNvSpPr>
+          <p:nvPr>
+            <p:ph type="title"/>
+          </p:nvPr>
+        </p:nvSpPr>
+        <p:spPr/>
+        <p:txBody>
+          <a:bodyPr/>
+          <a:lstStyle/>
+          <a:p>
+            <a:r>
+              <a:rPr lang="en-US" dirty="0" smtClean="0"/>
+              <a:t>Apache Hadoop and other</a:t>
+            </a:r>
+            <a:endParaRPr lang="en-US" dirty="0"/>
+          </a:p>
+        </p:txBody>
+      </p:sp>
+      <p:pic>
+        <p:nvPicPr>
+          <p:cNvPr id="4" name="Picture 3"/>
+          <p:cNvPicPr>
+            <a:picLocks noChangeAspect="1"/>
+          </p:cNvPicPr>
+          <p:nvPr/>
+        </p:nvPicPr>
+        <p:blipFill>
+          <a:blip r:embed="rId2"/>
+          <a:stretch>
+            <a:fillRect/>
+          </a:stretch>
+        </p:blipFill>
+        <p:spPr>
+          <a:xfrm>
+            <a:off x="1026760" y="1896035"/>
+            <a:ext cx="9160787" cy="3537137"/>
+          </a:xfrm>
+          <a:prstGeom prst="rect">
+            <a:avLst/>
+          </a:prstGeom>
+        </p:spPr>
+      </p:pic>
+    </p:spTree>
+    <p:extLst>
+      <p:ext uri="{BB962C8B-B14F-4D97-AF65-F5344CB8AC3E}">
+        <p14:creationId xmlns:p14="http://schemas.microsoft.com/office/powerpoint/2010/main" val="3720597417"/>
+      </p:ext>
+    </p:extLst>
+  </p:cSld>
+  <p:clrMapOvr>
+    <a:masterClrMapping/>
+  </p:clrMapOvr>
+  <p:timing>
+    <p:tnLst>
+      <p:par>
+        <p:cTn id="1" dur="indefinite" restart="never" nodeType="tmRoot"/>
+      </p:par>
+    </p:tnLst>
+  </p:timing>
+</p:sld>
+</file>
+
+<file path=ppt/slides/slide51.xml><?xml version="1.0" encoding="utf-8"?>
+<p:sld xmlns:a="http://schemas.openxmlformats.org/drawingml/2006/main" xmlns:r="http://schemas.openxmlformats.org/officeDocument/2006/relationships" xmlns:p="http://schemas.openxmlformats.org/presentationml/2006/main">
+  <p:cSld>
+    <p:spTree>
+      <p:nvGrpSpPr>
+        <p:cNvPr id="1" name=""/>
+        <p:cNvGrpSpPr/>
+        <p:nvPr/>
+      </p:nvGrpSpPr>
+      <p:grpSpPr>
+        <a:xfrm>
+          <a:off x="0" y="0"/>
+          <a:ext cx="0" cy="0"/>
+          <a:chOff x="0" y="0"/>
+          <a:chExt cx="0" cy="0"/>
+        </a:xfrm>
+      </p:grpSpPr>
+      <p:sp>
+        <p:nvSpPr>
+          <p:cNvPr id="2" name="Title 1"/>
+          <p:cNvSpPr>
+            <a:spLocks noGrp="1"/>
+          </p:cNvSpPr>
+          <p:nvPr>
+            <p:ph type="title"/>
+          </p:nvPr>
+        </p:nvSpPr>
+        <p:spPr/>
+        <p:txBody>
+          <a:bodyPr/>
+          <a:lstStyle/>
+          <a:p>
+            <a:r>
+              <a:rPr lang="en-US" dirty="0" smtClean="0"/>
+              <a:t>Aggregation strategy</a:t>
+            </a:r>
+            <a:endParaRPr lang="en-US" dirty="0"/>
+          </a:p>
+        </p:txBody>
+      </p:sp>
+      <p:sp>
+        <p:nvSpPr>
+          <p:cNvPr id="3" name="Content Placeholder 2"/>
+          <p:cNvSpPr>
+            <a:spLocks noGrp="1"/>
+          </p:cNvSpPr>
+          <p:nvPr>
+            <p:ph idx="1"/>
+          </p:nvPr>
+        </p:nvSpPr>
+        <p:spPr/>
+        <p:txBody>
+          <a:bodyPr/>
+          <a:lstStyle/>
+          <a:p>
+            <a:r>
+              <a:rPr lang="en-US" dirty="0" smtClean="0"/>
+              <a:t>For each skill in the job description</a:t>
+            </a:r>
+          </a:p>
+          <a:p>
+            <a:pPr lvl="1"/>
+            <a:r>
+              <a:rPr lang="en-US" dirty="0" smtClean="0"/>
+              <a:t>Calculate </a:t>
+            </a:r>
+            <a:r>
+              <a:rPr lang="en-US" dirty="0"/>
+              <a:t>S</a:t>
+            </a:r>
+            <a:r>
+              <a:rPr lang="en-US" dirty="0" smtClean="0"/>
+              <a:t>anchez similarity and Rodrigues distance for each skills</a:t>
+            </a:r>
+          </a:p>
+          <a:p>
+            <a:pPr lvl="1"/>
+            <a:r>
+              <a:rPr lang="en-US" dirty="0" smtClean="0"/>
+              <a:t>Filter skills with distance of 1</a:t>
+            </a:r>
+          </a:p>
+          <a:p>
+            <a:pPr lvl="1"/>
+            <a:r>
+              <a:rPr lang="en-US" dirty="0" smtClean="0"/>
+              <a:t>Calculate weighted average of the similarity with weights being (1- distance</a:t>
+            </a:r>
+            <a:r>
+              <a:rPr lang="en-US" smtClean="0"/>
+              <a:t>) value</a:t>
+            </a:r>
+            <a:endParaRPr lang="en-US" dirty="0" smtClean="0"/>
+          </a:p>
+        </p:txBody>
+      </p:sp>
+    </p:spTree>
+    <p:extLst>
+      <p:ext uri="{BB962C8B-B14F-4D97-AF65-F5344CB8AC3E}">
+        <p14:creationId xmlns:p14="http://schemas.microsoft.com/office/powerpoint/2010/main" val="3000546048"/>
+      </p:ext>
+    </p:extLst>
+  </p:cSld>
+  <p:clrMapOvr>
+    <a:masterClrMapping/>
+  </p:clrMapOvr>
+  <p:timing>
+    <p:tnLst>
+      <p:par>
+        <p:cTn id="1" dur="indefinite" restart="never" nodeType="tmRoot"/>
+      </p:par>
+    </p:tnLst>
+  </p:timing>
+</p:sld>
+</file>
+
+<file path=ppt/slides/slide52.xml><?xml version="1.0" encoding="utf-8"?>
+<p:sld xmlns:a="http://schemas.openxmlformats.org/drawingml/2006/main" xmlns:r="http://schemas.openxmlformats.org/officeDocument/2006/relationships" xmlns:p="http://schemas.openxmlformats.org/presentationml/2006/main">
+  <p:cSld>
+    <p:spTree>
+      <p:nvGrpSpPr>
+        <p:cNvPr id="1" name=""/>
+        <p:cNvGrpSpPr/>
+        <p:nvPr/>
+      </p:nvGrpSpPr>
+      <p:grpSpPr>
+        <a:xfrm>
+          <a:off x="0" y="0"/>
+          <a:ext cx="0" cy="0"/>
+          <a:chOff x="0" y="0"/>
+          <a:chExt cx="0" cy="0"/>
+        </a:xfrm>
+      </p:grpSpPr>
+      <p:sp>
+        <p:nvSpPr>
+          <p:cNvPr id="2" name="Title 1"/>
+          <p:cNvSpPr>
+            <a:spLocks noGrp="1"/>
+          </p:cNvSpPr>
+          <p:nvPr>
+            <p:ph type="title"/>
+          </p:nvPr>
+        </p:nvSpPr>
+        <p:spPr/>
+        <p:txBody>
+          <a:bodyPr/>
+          <a:lstStyle/>
+          <a:p>
+            <a:r>
+              <a:rPr lang="en-US" dirty="0" smtClean="0"/>
+              <a:t>Results</a:t>
+            </a:r>
+            <a:endParaRPr lang="en-US" dirty="0"/>
+          </a:p>
+        </p:txBody>
+      </p:sp>
+      <p:pic>
+        <p:nvPicPr>
+          <p:cNvPr id="4" name="Picture 3"/>
+          <p:cNvPicPr>
+            <a:picLocks noChangeAspect="1"/>
+          </p:cNvPicPr>
+          <p:nvPr/>
+        </p:nvPicPr>
+        <p:blipFill>
+          <a:blip r:embed="rId2"/>
+          <a:stretch>
+            <a:fillRect/>
+          </a:stretch>
+        </p:blipFill>
+        <p:spPr>
+          <a:xfrm>
+            <a:off x="1344707" y="1486915"/>
+            <a:ext cx="8189258" cy="5214604"/>
+          </a:xfrm>
+          <a:prstGeom prst="rect">
+            <a:avLst/>
+          </a:prstGeom>
+        </p:spPr>
+      </p:pic>
+    </p:spTree>
+    <p:extLst>
+      <p:ext uri="{BB962C8B-B14F-4D97-AF65-F5344CB8AC3E}">
+        <p14:creationId xmlns:p14="http://schemas.microsoft.com/office/powerpoint/2010/main" val="3801766241"/>
+      </p:ext>
+    </p:extLst>
+  </p:cSld>
+  <p:clrMapOvr>
+    <a:masterClrMapping/>
+  </p:clrMapOvr>
+  <p:timing>
+    <p:tnLst>
+      <p:par>
+        <p:cTn id="1" dur="indefinite" restart="never" nodeType="tmRoot"/>
+      </p:par>
+    </p:tnLst>
+  </p:timing>
+</p:sld>
+</file>
+
 <file path=ppt/slides/slide6.xml><?xml version="1.0" encoding="utf-8"?>
 <p:sld xmlns:a="http://schemas.openxmlformats.org/drawingml/2006/main" xmlns:r="http://schemas.openxmlformats.org/officeDocument/2006/relationships" xmlns:p="http://schemas.openxmlformats.org/presentationml/2006/main">
   <p:cSld>

</xml_diff>

<commit_message>
Restructuring Similarity and Pairwise Plotting
</commit_message>
<xml_diff>
--- a/CS297-2.pptx
+++ b/CS297-2.pptx
@@ -57,6 +57,14 @@
     <p:sldId id="306" r:id="rId51"/>
     <p:sldId id="307" r:id="rId52"/>
     <p:sldId id="308" r:id="rId53"/>
+    <p:sldId id="309" r:id="rId54"/>
+    <p:sldId id="310" r:id="rId55"/>
+    <p:sldId id="311" r:id="rId56"/>
+    <p:sldId id="312" r:id="rId57"/>
+    <p:sldId id="313" r:id="rId58"/>
+    <p:sldId id="314" r:id="rId59"/>
+    <p:sldId id="316" r:id="rId60"/>
+    <p:sldId id="315" r:id="rId61"/>
   </p:sldIdLst>
   <p:sldSz cx="12192000" cy="6858000"/>
   <p:notesSz cx="6858000" cy="9144000"/>
@@ -212,6 +220,14 @@
             <p14:sldId id="306"/>
             <p14:sldId id="307"/>
             <p14:sldId id="308"/>
+            <p14:sldId id="309"/>
+            <p14:sldId id="310"/>
+            <p14:sldId id="311"/>
+            <p14:sldId id="312"/>
+            <p14:sldId id="313"/>
+            <p14:sldId id="314"/>
+            <p14:sldId id="316"/>
+            <p14:sldId id="315"/>
           </p14:sldIdLst>
         </p14:section>
       </p14:sectionLst>
@@ -356,7 +372,7 @@
           <a:p>
             <a:fld id="{D4589B2A-79C4-4840-9D61-9546F1756974}" type="datetimeFigureOut">
               <a:rPr lang="en-US" smtClean="0"/>
-              <a:t>2/14/2018</a:t>
+              <a:t>3/14/2018</a:t>
             </a:fld>
             <a:endParaRPr lang="en-US"/>
           </a:p>
@@ -524,7 +540,7 @@
           <a:p>
             <a:fld id="{D4589B2A-79C4-4840-9D61-9546F1756974}" type="datetimeFigureOut">
               <a:rPr lang="en-US" smtClean="0"/>
-              <a:t>2/14/2018</a:t>
+              <a:t>3/14/2018</a:t>
             </a:fld>
             <a:endParaRPr lang="en-US"/>
           </a:p>
@@ -702,7 +718,7 @@
           <a:p>
             <a:fld id="{D4589B2A-79C4-4840-9D61-9546F1756974}" type="datetimeFigureOut">
               <a:rPr lang="en-US" smtClean="0"/>
-              <a:t>2/14/2018</a:t>
+              <a:t>3/14/2018</a:t>
             </a:fld>
             <a:endParaRPr lang="en-US"/>
           </a:p>
@@ -870,7 +886,7 @@
           <a:p>
             <a:fld id="{D4589B2A-79C4-4840-9D61-9546F1756974}" type="datetimeFigureOut">
               <a:rPr lang="en-US" smtClean="0"/>
-              <a:t>2/14/2018</a:t>
+              <a:t>3/14/2018</a:t>
             </a:fld>
             <a:endParaRPr lang="en-US"/>
           </a:p>
@@ -1115,7 +1131,7 @@
           <a:p>
             <a:fld id="{D4589B2A-79C4-4840-9D61-9546F1756974}" type="datetimeFigureOut">
               <a:rPr lang="en-US" smtClean="0"/>
-              <a:t>2/14/2018</a:t>
+              <a:t>3/14/2018</a:t>
             </a:fld>
             <a:endParaRPr lang="en-US"/>
           </a:p>
@@ -1344,7 +1360,7 @@
           <a:p>
             <a:fld id="{D4589B2A-79C4-4840-9D61-9546F1756974}" type="datetimeFigureOut">
               <a:rPr lang="en-US" smtClean="0"/>
-              <a:t>2/14/2018</a:t>
+              <a:t>3/14/2018</a:t>
             </a:fld>
             <a:endParaRPr lang="en-US"/>
           </a:p>
@@ -1708,7 +1724,7 @@
           <a:p>
             <a:fld id="{D4589B2A-79C4-4840-9D61-9546F1756974}" type="datetimeFigureOut">
               <a:rPr lang="en-US" smtClean="0"/>
-              <a:t>2/14/2018</a:t>
+              <a:t>3/14/2018</a:t>
             </a:fld>
             <a:endParaRPr lang="en-US"/>
           </a:p>
@@ -1825,7 +1841,7 @@
           <a:p>
             <a:fld id="{D4589B2A-79C4-4840-9D61-9546F1756974}" type="datetimeFigureOut">
               <a:rPr lang="en-US" smtClean="0"/>
-              <a:t>2/14/2018</a:t>
+              <a:t>3/14/2018</a:t>
             </a:fld>
             <a:endParaRPr lang="en-US"/>
           </a:p>
@@ -1920,7 +1936,7 @@
           <a:p>
             <a:fld id="{D4589B2A-79C4-4840-9D61-9546F1756974}" type="datetimeFigureOut">
               <a:rPr lang="en-US" smtClean="0"/>
-              <a:t>2/14/2018</a:t>
+              <a:t>3/14/2018</a:t>
             </a:fld>
             <a:endParaRPr lang="en-US"/>
           </a:p>
@@ -2195,7 +2211,7 @@
           <a:p>
             <a:fld id="{D4589B2A-79C4-4840-9D61-9546F1756974}" type="datetimeFigureOut">
               <a:rPr lang="en-US" smtClean="0"/>
-              <a:t>2/14/2018</a:t>
+              <a:t>3/14/2018</a:t>
             </a:fld>
             <a:endParaRPr lang="en-US"/>
           </a:p>
@@ -2447,7 +2463,7 @@
           <a:p>
             <a:fld id="{D4589B2A-79C4-4840-9D61-9546F1756974}" type="datetimeFigureOut">
               <a:rPr lang="en-US" smtClean="0"/>
-              <a:t>2/14/2018</a:t>
+              <a:t>3/14/2018</a:t>
             </a:fld>
             <a:endParaRPr lang="en-US"/>
           </a:p>
@@ -2658,7 +2674,7 @@
           <a:p>
             <a:fld id="{D4589B2A-79C4-4840-9D61-9546F1756974}" type="datetimeFigureOut">
               <a:rPr lang="en-US" smtClean="0"/>
-              <a:t>2/14/2018</a:t>
+              <a:t>3/14/2018</a:t>
             </a:fld>
             <a:endParaRPr lang="en-US"/>
           </a:p>
@@ -3117,6 +3133,13 @@
   <p:clrMapOvr>
     <a:masterClrMapping/>
   </p:clrMapOvr>
+  <p:timing>
+    <p:tnLst>
+      <p:par>
+        <p:cTn id="1" dur="indefinite" restart="never" nodeType="tmRoot"/>
+      </p:par>
+    </p:tnLst>
+  </p:timing>
 </p:sld>
 </file>
 
@@ -5933,6 +5956,13 @@
   <p:clrMapOvr>
     <a:masterClrMapping/>
   </p:clrMapOvr>
+  <p:timing>
+    <p:tnLst>
+      <p:par>
+        <p:cTn id="1" dur="indefinite" restart="never" nodeType="tmRoot"/>
+      </p:par>
+    </p:tnLst>
+  </p:timing>
 </p:sld>
 </file>
 
@@ -14977,8 +15007,8 @@
           </a:p>
         </p:txBody>
       </p:sp>
-      <mc:AlternateContent xmlns:mc="http://schemas.openxmlformats.org/markup-compatibility/2006">
-        <mc:Choice xmlns:a14="http://schemas.microsoft.com/office/drawing/2010/main" Requires="a14">
+      <mc:AlternateContent xmlns:mc="http://schemas.openxmlformats.org/markup-compatibility/2006" xmlns:a14="http://schemas.microsoft.com/office/drawing/2010/main">
+        <mc:Choice Requires="a14">
           <p:sp>
             <p:nvSpPr>
               <p:cNvPr id="3" name="Content Placeholder 2"/>
@@ -15241,14 +15271,7 @@
                     <a:latin typeface="Consolas" panose="020B0609020204030204" pitchFamily="49" charset="0"/>
                     <a:cs typeface="Consolas" panose="020B0609020204030204" pitchFamily="49" charset="0"/>
                   </a:rPr>
-                  <a:t>C</a:t>
-                </a:r>
-                <a:r>
-                  <a:rPr lang="en-US" sz="1400" dirty="0">
-                    <a:latin typeface="Consolas" panose="020B0609020204030204" pitchFamily="49" charset="0"/>
-                    <a:cs typeface="Consolas" panose="020B0609020204030204" pitchFamily="49" charset="0"/>
-                  </a:rPr>
-                  <a:t>++","</a:t>
+                  <a:t>C++","</a:t>
                 </a:r>
                 <a:r>
                   <a:rPr lang="en-US" sz="1400" dirty="0" err="1">
@@ -15302,7 +15325,7 @@
             </p:txBody>
           </p:sp>
         </mc:Choice>
-        <mc:Fallback>
+        <mc:Fallback xmlns="">
           <p:sp>
             <p:nvSpPr>
               <p:cNvPr id="3" name="Content Placeholder 2"/>
@@ -16114,6 +16137,2026 @@
 </p:sld>
 </file>
 
+<file path=ppt/slides/slide53.xml><?xml version="1.0" encoding="utf-8"?>
+<p:sld xmlns:a="http://schemas.openxmlformats.org/drawingml/2006/main" xmlns:r="http://schemas.openxmlformats.org/officeDocument/2006/relationships" xmlns:p="http://schemas.openxmlformats.org/presentationml/2006/main">
+  <p:cSld>
+    <p:spTree>
+      <p:nvGrpSpPr>
+        <p:cNvPr id="1" name=""/>
+        <p:cNvGrpSpPr/>
+        <p:nvPr/>
+      </p:nvGrpSpPr>
+      <p:grpSpPr>
+        <a:xfrm>
+          <a:off x="0" y="0"/>
+          <a:ext cx="0" cy="0"/>
+          <a:chOff x="0" y="0"/>
+          <a:chExt cx="0" cy="0"/>
+        </a:xfrm>
+      </p:grpSpPr>
+      <p:sp>
+        <p:nvSpPr>
+          <p:cNvPr id="2" name="Title 1"/>
+          <p:cNvSpPr>
+            <a:spLocks noGrp="1"/>
+          </p:cNvSpPr>
+          <p:nvPr>
+            <p:ph type="title"/>
+          </p:nvPr>
+        </p:nvSpPr>
+        <p:spPr/>
+        <p:txBody>
+          <a:bodyPr/>
+          <a:lstStyle/>
+          <a:p>
+            <a:r>
+              <a:rPr lang="en-US" dirty="0" smtClean="0"/>
+              <a:t>Improving skill matching</a:t>
+            </a:r>
+            <a:endParaRPr lang="en-US" dirty="0"/>
+          </a:p>
+        </p:txBody>
+      </p:sp>
+      <p:sp>
+        <p:nvSpPr>
+          <p:cNvPr id="3" name="Content Placeholder 2"/>
+          <p:cNvSpPr>
+            <a:spLocks noGrp="1"/>
+          </p:cNvSpPr>
+          <p:nvPr>
+            <p:ph idx="1"/>
+          </p:nvPr>
+        </p:nvSpPr>
+        <p:spPr>
+          <a:xfrm>
+            <a:off x="838200" y="1548534"/>
+            <a:ext cx="10515600" cy="4351338"/>
+          </a:xfrm>
+        </p:spPr>
+        <p:txBody>
+          <a:bodyPr/>
+          <a:lstStyle/>
+          <a:p>
+            <a:r>
+              <a:rPr lang="en-US" dirty="0" smtClean="0"/>
+              <a:t>One of the current problems is to match the skill with the corresponding node in the ontology database.</a:t>
+            </a:r>
+          </a:p>
+          <a:p>
+            <a:r>
+              <a:rPr lang="en-US" dirty="0" smtClean="0"/>
+              <a:t>Reason for it is that skills take several representations</a:t>
+            </a:r>
+          </a:p>
+          <a:p>
+            <a:pPr lvl="1"/>
+            <a:r>
+              <a:rPr lang="en-US" dirty="0" err="1" smtClean="0"/>
+              <a:t>Couchbase</a:t>
+            </a:r>
+            <a:r>
+              <a:rPr lang="en-US" dirty="0" smtClean="0"/>
+              <a:t> server is  referred to as </a:t>
+            </a:r>
+            <a:r>
+              <a:rPr lang="en-US" dirty="0" err="1" smtClean="0"/>
+              <a:t>Membase</a:t>
+            </a:r>
+            <a:r>
+              <a:rPr lang="en-US" dirty="0" smtClean="0"/>
+              <a:t> or just </a:t>
+            </a:r>
+            <a:r>
+              <a:rPr lang="en-US" dirty="0" err="1" smtClean="0"/>
+              <a:t>Couchbase</a:t>
+            </a:r>
+            <a:endParaRPr lang="en-US" dirty="0" smtClean="0"/>
+          </a:p>
+          <a:p>
+            <a:pPr lvl="1"/>
+            <a:r>
+              <a:rPr lang="en-US" dirty="0" smtClean="0"/>
+              <a:t>ODBC can be referred to as Open database connectivity. </a:t>
+            </a:r>
+          </a:p>
+          <a:p>
+            <a:pPr marL="457200" lvl="1" indent="0">
+              <a:buNone/>
+            </a:pPr>
+            <a:endParaRPr lang="en-US" dirty="0" smtClean="0"/>
+          </a:p>
+          <a:p>
+            <a:pPr marL="228600" lvl="1">
+              <a:spcBef>
+                <a:spcPts val="1000"/>
+              </a:spcBef>
+            </a:pPr>
+            <a:r>
+              <a:rPr lang="en-US" sz="2800" dirty="0" smtClean="0"/>
+              <a:t>Improving the skill matching by utilizing the </a:t>
+            </a:r>
+            <a:r>
+              <a:rPr lang="en-US" sz="2800" dirty="0" err="1" smtClean="0"/>
+              <a:t>wikiredirects</a:t>
+            </a:r>
+            <a:r>
+              <a:rPr lang="en-US" sz="2800" dirty="0" smtClean="0"/>
+              <a:t> property for each resource</a:t>
+            </a:r>
+          </a:p>
+          <a:p>
+            <a:pPr marL="228600" lvl="1">
+              <a:spcBef>
+                <a:spcPts val="1000"/>
+              </a:spcBef>
+            </a:pPr>
+            <a:endParaRPr lang="en-US" sz="2800" dirty="0"/>
+          </a:p>
+          <a:p>
+            <a:pPr lvl="1"/>
+            <a:endParaRPr lang="en-US" dirty="0"/>
+          </a:p>
+        </p:txBody>
+      </p:sp>
+      <p:pic>
+        <p:nvPicPr>
+          <p:cNvPr id="4" name="Picture 3"/>
+          <p:cNvPicPr>
+            <a:picLocks noChangeAspect="1"/>
+          </p:cNvPicPr>
+          <p:nvPr/>
+        </p:nvPicPr>
+        <p:blipFill>
+          <a:blip r:embed="rId2"/>
+          <a:stretch>
+            <a:fillRect/>
+          </a:stretch>
+        </p:blipFill>
+        <p:spPr>
+          <a:xfrm>
+            <a:off x="6096000" y="4517880"/>
+            <a:ext cx="4981575" cy="1895475"/>
+          </a:xfrm>
+          <a:prstGeom prst="rect">
+            <a:avLst/>
+          </a:prstGeom>
+        </p:spPr>
+      </p:pic>
+    </p:spTree>
+    <p:extLst>
+      <p:ext uri="{BB962C8B-B14F-4D97-AF65-F5344CB8AC3E}">
+        <p14:creationId xmlns:p14="http://schemas.microsoft.com/office/powerpoint/2010/main" val="3568255604"/>
+      </p:ext>
+    </p:extLst>
+  </p:cSld>
+  <p:clrMapOvr>
+    <a:masterClrMapping/>
+  </p:clrMapOvr>
+</p:sld>
+</file>
+
+<file path=ppt/slides/slide54.xml><?xml version="1.0" encoding="utf-8"?>
+<p:sld xmlns:a="http://schemas.openxmlformats.org/drawingml/2006/main" xmlns:r="http://schemas.openxmlformats.org/officeDocument/2006/relationships" xmlns:p="http://schemas.openxmlformats.org/presentationml/2006/main">
+  <p:cSld>
+    <p:spTree>
+      <p:nvGrpSpPr>
+        <p:cNvPr id="1" name=""/>
+        <p:cNvGrpSpPr/>
+        <p:nvPr/>
+      </p:nvGrpSpPr>
+      <p:grpSpPr>
+        <a:xfrm>
+          <a:off x="0" y="0"/>
+          <a:ext cx="0" cy="0"/>
+          <a:chOff x="0" y="0"/>
+          <a:chExt cx="0" cy="0"/>
+        </a:xfrm>
+      </p:grpSpPr>
+      <p:sp>
+        <p:nvSpPr>
+          <p:cNvPr id="2" name="Title 1"/>
+          <p:cNvSpPr>
+            <a:spLocks noGrp="1"/>
+          </p:cNvSpPr>
+          <p:nvPr>
+            <p:ph type="title"/>
+          </p:nvPr>
+        </p:nvSpPr>
+        <p:spPr>
+          <a:xfrm>
+            <a:off x="838200" y="365125"/>
+            <a:ext cx="10515600" cy="885451"/>
+          </a:xfrm>
+        </p:spPr>
+        <p:txBody>
+          <a:bodyPr/>
+          <a:lstStyle/>
+          <a:p>
+            <a:r>
+              <a:rPr lang="en-US" dirty="0"/>
+              <a:t>Improving skill matching</a:t>
+            </a:r>
+          </a:p>
+        </p:txBody>
+      </p:sp>
+      <p:sp>
+        <p:nvSpPr>
+          <p:cNvPr id="3" name="Content Placeholder 2"/>
+          <p:cNvSpPr>
+            <a:spLocks noGrp="1"/>
+          </p:cNvSpPr>
+          <p:nvPr>
+            <p:ph idx="1"/>
+          </p:nvPr>
+        </p:nvSpPr>
+        <p:spPr>
+          <a:xfrm>
+            <a:off x="838200" y="1573306"/>
+            <a:ext cx="9744635" cy="1788459"/>
+          </a:xfrm>
+        </p:spPr>
+        <p:txBody>
+          <a:bodyPr/>
+          <a:lstStyle/>
+          <a:p>
+            <a:r>
+              <a:rPr lang="en-US" dirty="0" smtClean="0"/>
+              <a:t>Created a new type of node and relationship in the ontology database</a:t>
+            </a:r>
+          </a:p>
+          <a:p>
+            <a:r>
+              <a:rPr lang="en-US" dirty="0" smtClean="0"/>
+              <a:t>Modified the similarity flow to account for aliases</a:t>
+            </a:r>
+            <a:endParaRPr lang="en-US" dirty="0"/>
+          </a:p>
+          <a:p>
+            <a:endParaRPr lang="en-US" dirty="0"/>
+          </a:p>
+        </p:txBody>
+      </p:sp>
+      <p:pic>
+        <p:nvPicPr>
+          <p:cNvPr id="4" name="Picture 3"/>
+          <p:cNvPicPr>
+            <a:picLocks noChangeAspect="1"/>
+          </p:cNvPicPr>
+          <p:nvPr/>
+        </p:nvPicPr>
+        <p:blipFill>
+          <a:blip r:embed="rId2"/>
+          <a:stretch>
+            <a:fillRect/>
+          </a:stretch>
+        </p:blipFill>
+        <p:spPr>
+          <a:xfrm>
+            <a:off x="688880" y="3483815"/>
+            <a:ext cx="4649602" cy="2904877"/>
+          </a:xfrm>
+          <a:prstGeom prst="rect">
+            <a:avLst/>
+          </a:prstGeom>
+        </p:spPr>
+      </p:pic>
+      <p:pic>
+        <p:nvPicPr>
+          <p:cNvPr id="5" name="Picture 4"/>
+          <p:cNvPicPr>
+            <a:picLocks noChangeAspect="1"/>
+          </p:cNvPicPr>
+          <p:nvPr/>
+        </p:nvPicPr>
+        <p:blipFill>
+          <a:blip r:embed="rId3"/>
+          <a:stretch>
+            <a:fillRect/>
+          </a:stretch>
+        </p:blipFill>
+        <p:spPr>
+          <a:xfrm>
+            <a:off x="6996952" y="3684495"/>
+            <a:ext cx="2790825" cy="2476500"/>
+          </a:xfrm>
+          <a:prstGeom prst="rect">
+            <a:avLst/>
+          </a:prstGeom>
+        </p:spPr>
+      </p:pic>
+    </p:spTree>
+    <p:extLst>
+      <p:ext uri="{BB962C8B-B14F-4D97-AF65-F5344CB8AC3E}">
+        <p14:creationId xmlns:p14="http://schemas.microsoft.com/office/powerpoint/2010/main" val="3359630081"/>
+      </p:ext>
+    </p:extLst>
+  </p:cSld>
+  <p:clrMapOvr>
+    <a:masterClrMapping/>
+  </p:clrMapOvr>
+</p:sld>
+</file>
+
+<file path=ppt/slides/slide55.xml><?xml version="1.0" encoding="utf-8"?>
+<p:sld xmlns:a="http://schemas.openxmlformats.org/drawingml/2006/main" xmlns:r="http://schemas.openxmlformats.org/officeDocument/2006/relationships" xmlns:p="http://schemas.openxmlformats.org/presentationml/2006/main">
+  <p:cSld>
+    <p:spTree>
+      <p:nvGrpSpPr>
+        <p:cNvPr id="1" name=""/>
+        <p:cNvGrpSpPr/>
+        <p:nvPr/>
+      </p:nvGrpSpPr>
+      <p:grpSpPr>
+        <a:xfrm>
+          <a:off x="0" y="0"/>
+          <a:ext cx="0" cy="0"/>
+          <a:chOff x="0" y="0"/>
+          <a:chExt cx="0" cy="0"/>
+        </a:xfrm>
+      </p:grpSpPr>
+      <p:grpSp>
+        <p:nvGrpSpPr>
+          <p:cNvPr id="47" name="Group 46"/>
+          <p:cNvGrpSpPr/>
+          <p:nvPr/>
+        </p:nvGrpSpPr>
+        <p:grpSpPr>
+          <a:xfrm>
+            <a:off x="2849091" y="776569"/>
+            <a:ext cx="8599395" cy="5859557"/>
+            <a:chOff x="2729752" y="776569"/>
+            <a:chExt cx="8599395" cy="5859557"/>
+          </a:xfrm>
+        </p:grpSpPr>
+        <p:grpSp>
+          <p:nvGrpSpPr>
+            <p:cNvPr id="37" name="Group 36"/>
+            <p:cNvGrpSpPr/>
+            <p:nvPr/>
+          </p:nvGrpSpPr>
+          <p:grpSpPr>
+            <a:xfrm>
+              <a:off x="2729752" y="2091018"/>
+              <a:ext cx="8599395" cy="4545108"/>
+              <a:chOff x="2837329" y="1452283"/>
+              <a:chExt cx="8599395" cy="4545108"/>
+            </a:xfrm>
+          </p:grpSpPr>
+          <p:sp>
+            <p:nvSpPr>
+              <p:cNvPr id="5" name="Rectangle 4"/>
+              <p:cNvSpPr/>
+              <p:nvPr/>
+            </p:nvSpPr>
+            <p:spPr>
+              <a:xfrm>
+                <a:off x="4182034" y="1452283"/>
+                <a:ext cx="2299447" cy="874059"/>
+              </a:xfrm>
+              <a:prstGeom prst="rect">
+                <a:avLst/>
+              </a:prstGeom>
+            </p:spPr>
+            <p:style>
+              <a:lnRef idx="2">
+                <a:schemeClr val="accent1">
+                  <a:shade val="50000"/>
+                </a:schemeClr>
+              </a:lnRef>
+              <a:fillRef idx="1">
+                <a:schemeClr val="accent1"/>
+              </a:fillRef>
+              <a:effectRef idx="0">
+                <a:schemeClr val="accent1"/>
+              </a:effectRef>
+              <a:fontRef idx="minor">
+                <a:schemeClr val="lt1"/>
+              </a:fontRef>
+            </p:style>
+            <p:txBody>
+              <a:bodyPr rtlCol="0" anchor="ctr"/>
+              <a:lstStyle/>
+              <a:p>
+                <a:pPr algn="ctr"/>
+                <a:r>
+                  <a:rPr lang="en-US" dirty="0" smtClean="0"/>
+                  <a:t>Skill Matcher</a:t>
+                </a:r>
+              </a:p>
+              <a:p>
+                <a:pPr algn="ctr"/>
+                <a:r>
+                  <a:rPr lang="en-US" sz="1200" dirty="0" smtClean="0"/>
+                  <a:t>(MATCH SKILL BY NAME OR ALIAS)</a:t>
+                </a:r>
+                <a:endParaRPr lang="en-US" sz="1200" dirty="0"/>
+              </a:p>
+            </p:txBody>
+          </p:sp>
+          <p:sp>
+            <p:nvSpPr>
+              <p:cNvPr id="6" name="Flowchart: Magnetic Disk 5"/>
+              <p:cNvSpPr/>
+              <p:nvPr/>
+            </p:nvSpPr>
+            <p:spPr>
+              <a:xfrm>
+                <a:off x="10320618" y="2326342"/>
+                <a:ext cx="1116106" cy="1183341"/>
+              </a:xfrm>
+              <a:prstGeom prst="flowChartMagneticDisk">
+                <a:avLst/>
+              </a:prstGeom>
+            </p:spPr>
+            <p:style>
+              <a:lnRef idx="3">
+                <a:schemeClr val="lt1"/>
+              </a:lnRef>
+              <a:fillRef idx="1">
+                <a:schemeClr val="accent2"/>
+              </a:fillRef>
+              <a:effectRef idx="1">
+                <a:schemeClr val="accent2"/>
+              </a:effectRef>
+              <a:fontRef idx="minor">
+                <a:schemeClr val="lt1"/>
+              </a:fontRef>
+            </p:style>
+            <p:txBody>
+              <a:bodyPr rtlCol="0" anchor="ctr"/>
+              <a:lstStyle/>
+              <a:p>
+                <a:pPr algn="ctr"/>
+                <a:r>
+                  <a:rPr lang="en-US" dirty="0" smtClean="0"/>
+                  <a:t>Ontology</a:t>
+                </a:r>
+                <a:endParaRPr lang="en-US" dirty="0"/>
+              </a:p>
+            </p:txBody>
+          </p:sp>
+          <p:cxnSp>
+            <p:nvCxnSpPr>
+              <p:cNvPr id="10" name="Elbow Connector 9"/>
+              <p:cNvCxnSpPr>
+                <a:stCxn id="5" idx="3"/>
+                <a:endCxn id="6" idx="2"/>
+              </p:cNvCxnSpPr>
+              <p:nvPr/>
+            </p:nvCxnSpPr>
+            <p:spPr>
+              <a:xfrm>
+                <a:off x="6481481" y="1889313"/>
+                <a:ext cx="3839137" cy="1028700"/>
+              </a:xfrm>
+              <a:prstGeom prst="bentConnector3">
+                <a:avLst/>
+              </a:prstGeom>
+              <a:ln w="9525" cap="flat" cmpd="sng" algn="ctr">
+                <a:solidFill>
+                  <a:schemeClr val="dk1"/>
+                </a:solidFill>
+                <a:prstDash val="dash"/>
+                <a:round/>
+                <a:headEnd type="none" w="med" len="med"/>
+                <a:tailEnd type="none" w="med" len="med"/>
+              </a:ln>
+            </p:spPr>
+            <p:style>
+              <a:lnRef idx="0">
+                <a:scrgbClr r="0" g="0" b="0"/>
+              </a:lnRef>
+              <a:fillRef idx="0">
+                <a:scrgbClr r="0" g="0" b="0"/>
+              </a:fillRef>
+              <a:effectRef idx="0">
+                <a:scrgbClr r="0" g="0" b="0"/>
+              </a:effectRef>
+              <a:fontRef idx="minor">
+                <a:schemeClr val="tx1"/>
+              </a:fontRef>
+            </p:style>
+          </p:cxnSp>
+          <p:sp>
+            <p:nvSpPr>
+              <p:cNvPr id="11" name="Rounded Rectangle 10"/>
+              <p:cNvSpPr/>
+              <p:nvPr/>
+            </p:nvSpPr>
+            <p:spPr>
+              <a:xfrm>
+                <a:off x="2837329" y="2605370"/>
+                <a:ext cx="2420469" cy="974911"/>
+              </a:xfrm>
+              <a:prstGeom prst="roundRect">
+                <a:avLst/>
+              </a:prstGeom>
+            </p:spPr>
+            <p:style>
+              <a:lnRef idx="2">
+                <a:schemeClr val="accent6"/>
+              </a:lnRef>
+              <a:fillRef idx="1">
+                <a:schemeClr val="lt1"/>
+              </a:fillRef>
+              <a:effectRef idx="0">
+                <a:schemeClr val="accent6"/>
+              </a:effectRef>
+              <a:fontRef idx="minor">
+                <a:schemeClr val="dk1"/>
+              </a:fontRef>
+            </p:style>
+            <p:txBody>
+              <a:bodyPr rtlCol="0" anchor="t"/>
+              <a:lstStyle/>
+              <a:p>
+                <a:r>
+                  <a:rPr lang="en-US" sz="1100" dirty="0" smtClean="0">
+                    <a:latin typeface="Consolas" panose="020B0609020204030204" pitchFamily="49" charset="0"/>
+                    <a:cs typeface="Consolas" panose="020B0609020204030204" pitchFamily="49" charset="0"/>
+                  </a:rPr>
+                  <a:t>{</a:t>
+                </a:r>
+              </a:p>
+              <a:p>
+                <a:r>
+                  <a:rPr lang="en-US" sz="1100" dirty="0" smtClean="0">
+                    <a:latin typeface="Consolas" panose="020B0609020204030204" pitchFamily="49" charset="0"/>
+                    <a:cs typeface="Consolas" panose="020B0609020204030204" pitchFamily="49" charset="0"/>
+                  </a:rPr>
+                  <a:t>“</a:t>
+                </a:r>
+                <a:r>
+                  <a:rPr lang="en-US" sz="1100" dirty="0">
+                    <a:latin typeface="Consolas" panose="020B0609020204030204" pitchFamily="49" charset="0"/>
+                    <a:cs typeface="Consolas" panose="020B0609020204030204" pitchFamily="49" charset="0"/>
+                  </a:rPr>
+                  <a:t>id</a:t>
+                </a:r>
+                <a:r>
+                  <a:rPr lang="en-US" sz="1100" dirty="0" smtClean="0">
+                    <a:latin typeface="Consolas" panose="020B0609020204030204" pitchFamily="49" charset="0"/>
+                    <a:cs typeface="Consolas" panose="020B0609020204030204" pitchFamily="49" charset="0"/>
+                  </a:rPr>
+                  <a:t>”: </a:t>
+                </a:r>
+                <a:r>
+                  <a:rPr lang="en-US" sz="1100" i="1" dirty="0" smtClean="0">
+                    <a:latin typeface="Consolas" panose="020B0609020204030204" pitchFamily="49" charset="0"/>
+                    <a:cs typeface="Consolas" panose="020B0609020204030204" pitchFamily="49" charset="0"/>
+                  </a:rPr>
+                  <a:t>URI</a:t>
+                </a:r>
+                <a:endParaRPr lang="en-US" sz="1100" dirty="0" smtClean="0">
+                  <a:latin typeface="Consolas" panose="020B0609020204030204" pitchFamily="49" charset="0"/>
+                  <a:cs typeface="Consolas" panose="020B0609020204030204" pitchFamily="49" charset="0"/>
+                </a:endParaRPr>
+              </a:p>
+              <a:p>
+                <a:r>
+                  <a:rPr lang="en-US" sz="1100" dirty="0" smtClean="0">
+                    <a:latin typeface="Consolas" panose="020B0609020204030204" pitchFamily="49" charset="0"/>
+                    <a:cs typeface="Consolas" panose="020B0609020204030204" pitchFamily="49" charset="0"/>
+                  </a:rPr>
+                  <a:t>“</a:t>
+                </a:r>
+                <a:r>
+                  <a:rPr lang="en-US" sz="1100" dirty="0">
+                    <a:latin typeface="Consolas" panose="020B0609020204030204" pitchFamily="49" charset="0"/>
+                    <a:cs typeface="Consolas" panose="020B0609020204030204" pitchFamily="49" charset="0"/>
+                  </a:rPr>
+                  <a:t>name”: “</a:t>
+                </a:r>
+                <a:r>
+                  <a:rPr lang="en-US" sz="1100" dirty="0" err="1" smtClean="0">
+                    <a:latin typeface="Consolas" panose="020B0609020204030204" pitchFamily="49" charset="0"/>
+                    <a:cs typeface="Consolas" panose="020B0609020204030204" pitchFamily="49" charset="0"/>
+                  </a:rPr>
+                  <a:t>Couchbase_Server</a:t>
+                </a:r>
+                <a:r>
+                  <a:rPr lang="en-US" sz="1100" dirty="0" smtClean="0">
+                    <a:latin typeface="Consolas" panose="020B0609020204030204" pitchFamily="49" charset="0"/>
+                    <a:cs typeface="Consolas" panose="020B0609020204030204" pitchFamily="49" charset="0"/>
+                  </a:rPr>
+                  <a:t>”</a:t>
+                </a:r>
+              </a:p>
+              <a:p>
+                <a:r>
+                  <a:rPr lang="en-US" sz="1100" dirty="0">
+                    <a:latin typeface="Consolas" panose="020B0609020204030204" pitchFamily="49" charset="0"/>
+                    <a:cs typeface="Consolas" panose="020B0609020204030204" pitchFamily="49" charset="0"/>
+                  </a:rPr>
+                  <a:t>}</a:t>
+                </a:r>
+              </a:p>
+            </p:txBody>
+          </p:sp>
+          <p:sp>
+            <p:nvSpPr>
+              <p:cNvPr id="14" name="Rounded Rectangle 13"/>
+              <p:cNvSpPr/>
+              <p:nvPr/>
+            </p:nvSpPr>
+            <p:spPr>
+              <a:xfrm>
+                <a:off x="5563721" y="2605370"/>
+                <a:ext cx="2420469" cy="974911"/>
+              </a:xfrm>
+              <a:prstGeom prst="roundRect">
+                <a:avLst/>
+              </a:prstGeom>
+            </p:spPr>
+            <p:style>
+              <a:lnRef idx="2">
+                <a:schemeClr val="accent6"/>
+              </a:lnRef>
+              <a:fillRef idx="1">
+                <a:schemeClr val="lt1"/>
+              </a:fillRef>
+              <a:effectRef idx="0">
+                <a:schemeClr val="accent6"/>
+              </a:effectRef>
+              <a:fontRef idx="minor">
+                <a:schemeClr val="dk1"/>
+              </a:fontRef>
+            </p:style>
+            <p:txBody>
+              <a:bodyPr rtlCol="0" anchor="t"/>
+              <a:lstStyle/>
+              <a:p>
+                <a:r>
+                  <a:rPr lang="en-US" sz="1100" dirty="0" smtClean="0">
+                    <a:latin typeface="Consolas" panose="020B0609020204030204" pitchFamily="49" charset="0"/>
+                    <a:cs typeface="Consolas" panose="020B0609020204030204" pitchFamily="49" charset="0"/>
+                  </a:rPr>
+                  <a:t>{</a:t>
+                </a:r>
+              </a:p>
+              <a:p>
+                <a:r>
+                  <a:rPr lang="en-US" sz="1100" dirty="0" smtClean="0">
+                    <a:latin typeface="Consolas" panose="020B0609020204030204" pitchFamily="49" charset="0"/>
+                    <a:cs typeface="Consolas" panose="020B0609020204030204" pitchFamily="49" charset="0"/>
+                  </a:rPr>
+                  <a:t>“</a:t>
+                </a:r>
+                <a:r>
+                  <a:rPr lang="en-US" sz="1100" dirty="0">
+                    <a:latin typeface="Consolas" panose="020B0609020204030204" pitchFamily="49" charset="0"/>
+                    <a:cs typeface="Consolas" panose="020B0609020204030204" pitchFamily="49" charset="0"/>
+                  </a:rPr>
+                  <a:t>id</a:t>
+                </a:r>
+                <a:r>
+                  <a:rPr lang="en-US" sz="1100" dirty="0" smtClean="0">
+                    <a:latin typeface="Consolas" panose="020B0609020204030204" pitchFamily="49" charset="0"/>
+                    <a:cs typeface="Consolas" panose="020B0609020204030204" pitchFamily="49" charset="0"/>
+                  </a:rPr>
+                  <a:t>”: </a:t>
+                </a:r>
+                <a:r>
+                  <a:rPr lang="en-US" sz="1100" i="1" dirty="0" smtClean="0">
+                    <a:latin typeface="Consolas" panose="020B0609020204030204" pitchFamily="49" charset="0"/>
+                    <a:cs typeface="Consolas" panose="020B0609020204030204" pitchFamily="49" charset="0"/>
+                  </a:rPr>
+                  <a:t>URI</a:t>
+                </a:r>
+                <a:endParaRPr lang="en-US" sz="1100" dirty="0" smtClean="0">
+                  <a:latin typeface="Consolas" panose="020B0609020204030204" pitchFamily="49" charset="0"/>
+                  <a:cs typeface="Consolas" panose="020B0609020204030204" pitchFamily="49" charset="0"/>
+                </a:endParaRPr>
+              </a:p>
+              <a:p>
+                <a:r>
+                  <a:rPr lang="en-US" sz="1100" dirty="0" smtClean="0">
+                    <a:latin typeface="Consolas" panose="020B0609020204030204" pitchFamily="49" charset="0"/>
+                    <a:cs typeface="Consolas" panose="020B0609020204030204" pitchFamily="49" charset="0"/>
+                  </a:rPr>
+                  <a:t>“</a:t>
+                </a:r>
+                <a:r>
+                  <a:rPr lang="en-US" sz="1100" dirty="0">
+                    <a:latin typeface="Consolas" panose="020B0609020204030204" pitchFamily="49" charset="0"/>
+                    <a:cs typeface="Consolas" panose="020B0609020204030204" pitchFamily="49" charset="0"/>
+                  </a:rPr>
+                  <a:t>name”: </a:t>
+                </a:r>
+                <a:r>
+                  <a:rPr lang="en-US" sz="1100" dirty="0" smtClean="0">
+                    <a:latin typeface="Consolas" panose="020B0609020204030204" pitchFamily="49" charset="0"/>
+                    <a:cs typeface="Consolas" panose="020B0609020204030204" pitchFamily="49" charset="0"/>
+                  </a:rPr>
+                  <a:t>“</a:t>
+                </a:r>
+                <a:r>
+                  <a:rPr lang="en-US" sz="1100" dirty="0" err="1" smtClean="0">
+                    <a:latin typeface="Consolas" panose="020B0609020204030204" pitchFamily="49" charset="0"/>
+                    <a:cs typeface="Consolas" panose="020B0609020204030204" pitchFamily="49" charset="0"/>
+                  </a:rPr>
+                  <a:t>Berkley_DB</a:t>
+                </a:r>
+                <a:r>
+                  <a:rPr lang="en-US" sz="1100" dirty="0" smtClean="0">
+                    <a:latin typeface="Consolas" panose="020B0609020204030204" pitchFamily="49" charset="0"/>
+                    <a:cs typeface="Consolas" panose="020B0609020204030204" pitchFamily="49" charset="0"/>
+                  </a:rPr>
+                  <a:t>”</a:t>
+                </a:r>
+              </a:p>
+              <a:p>
+                <a:r>
+                  <a:rPr lang="en-US" sz="1100" dirty="0">
+                    <a:latin typeface="Consolas" panose="020B0609020204030204" pitchFamily="49" charset="0"/>
+                    <a:cs typeface="Consolas" panose="020B0609020204030204" pitchFamily="49" charset="0"/>
+                  </a:rPr>
+                  <a:t>}</a:t>
+                </a:r>
+              </a:p>
+            </p:txBody>
+          </p:sp>
+          <p:cxnSp>
+            <p:nvCxnSpPr>
+              <p:cNvPr id="17" name="Elbow Connector 16"/>
+              <p:cNvCxnSpPr>
+                <a:stCxn id="5" idx="2"/>
+                <a:endCxn id="11" idx="0"/>
+              </p:cNvCxnSpPr>
+              <p:nvPr/>
+            </p:nvCxnSpPr>
+            <p:spPr>
+              <a:xfrm rot="5400000">
+                <a:off x="4550147" y="1823759"/>
+                <a:ext cx="279028" cy="1284194"/>
+              </a:xfrm>
+              <a:prstGeom prst="bentConnector3">
+                <a:avLst/>
+              </a:prstGeom>
+              <a:ln>
+                <a:tailEnd type="triangle"/>
+              </a:ln>
+            </p:spPr>
+            <p:style>
+              <a:lnRef idx="1">
+                <a:schemeClr val="dk1"/>
+              </a:lnRef>
+              <a:fillRef idx="0">
+                <a:schemeClr val="dk1"/>
+              </a:fillRef>
+              <a:effectRef idx="0">
+                <a:schemeClr val="dk1"/>
+              </a:effectRef>
+              <a:fontRef idx="minor">
+                <a:schemeClr val="tx1"/>
+              </a:fontRef>
+            </p:style>
+          </p:cxnSp>
+          <p:cxnSp>
+            <p:nvCxnSpPr>
+              <p:cNvPr id="21" name="Elbow Connector 20"/>
+              <p:cNvCxnSpPr>
+                <a:stCxn id="5" idx="2"/>
+                <a:endCxn id="14" idx="0"/>
+              </p:cNvCxnSpPr>
+              <p:nvPr/>
+            </p:nvCxnSpPr>
+            <p:spPr>
+              <a:xfrm rot="16200000" flipH="1">
+                <a:off x="5913343" y="1744757"/>
+                <a:ext cx="279028" cy="1442198"/>
+              </a:xfrm>
+              <a:prstGeom prst="bentConnector3">
+                <a:avLst/>
+              </a:prstGeom>
+              <a:ln>
+                <a:tailEnd type="triangle"/>
+              </a:ln>
+            </p:spPr>
+            <p:style>
+              <a:lnRef idx="1">
+                <a:schemeClr val="dk1"/>
+              </a:lnRef>
+              <a:fillRef idx="0">
+                <a:schemeClr val="dk1"/>
+              </a:fillRef>
+              <a:effectRef idx="0">
+                <a:schemeClr val="dk1"/>
+              </a:effectRef>
+              <a:fontRef idx="minor">
+                <a:schemeClr val="tx1"/>
+              </a:fontRef>
+            </p:style>
+          </p:cxnSp>
+          <p:sp>
+            <p:nvSpPr>
+              <p:cNvPr id="22" name="Rectangle 21"/>
+              <p:cNvSpPr/>
+              <p:nvPr/>
+            </p:nvSpPr>
+            <p:spPr>
+              <a:xfrm>
+                <a:off x="4267760" y="3859309"/>
+                <a:ext cx="2591922" cy="874056"/>
+              </a:xfrm>
+              <a:prstGeom prst="rect">
+                <a:avLst/>
+              </a:prstGeom>
+            </p:spPr>
+            <p:style>
+              <a:lnRef idx="2">
+                <a:schemeClr val="accent1">
+                  <a:shade val="50000"/>
+                </a:schemeClr>
+              </a:lnRef>
+              <a:fillRef idx="1">
+                <a:schemeClr val="accent1"/>
+              </a:fillRef>
+              <a:effectRef idx="0">
+                <a:schemeClr val="accent1"/>
+              </a:effectRef>
+              <a:fontRef idx="minor">
+                <a:schemeClr val="lt1"/>
+              </a:fontRef>
+            </p:style>
+            <p:txBody>
+              <a:bodyPr rtlCol="0" anchor="ctr"/>
+              <a:lstStyle/>
+              <a:p>
+                <a:pPr algn="ctr"/>
+                <a:r>
+                  <a:rPr lang="en-US" dirty="0" smtClean="0"/>
+                  <a:t>Skill </a:t>
+                </a:r>
+                <a:r>
+                  <a:rPr lang="en-US" dirty="0" err="1" smtClean="0"/>
+                  <a:t>Smilarity</a:t>
+                </a:r>
+                <a:endParaRPr lang="en-US" dirty="0" smtClean="0"/>
+              </a:p>
+              <a:p>
+                <a:pPr algn="ctr"/>
+                <a:r>
+                  <a:rPr lang="en-US" sz="1100" dirty="0" smtClean="0"/>
+                  <a:t>(CALCULATE DISTANCE AND SIMILARITY)</a:t>
+                </a:r>
+                <a:endParaRPr lang="en-US" sz="1100" dirty="0"/>
+              </a:p>
+            </p:txBody>
+          </p:sp>
+          <p:cxnSp>
+            <p:nvCxnSpPr>
+              <p:cNvPr id="24" name="Elbow Connector 23"/>
+              <p:cNvCxnSpPr>
+                <a:stCxn id="22" idx="3"/>
+                <a:endCxn id="6" idx="2"/>
+              </p:cNvCxnSpPr>
+              <p:nvPr/>
+            </p:nvCxnSpPr>
+            <p:spPr>
+              <a:xfrm flipV="1">
+                <a:off x="6859682" y="2918013"/>
+                <a:ext cx="3460936" cy="1378324"/>
+              </a:xfrm>
+              <a:prstGeom prst="bentConnector3">
+                <a:avLst/>
+              </a:prstGeom>
+              <a:ln w="9525" cap="flat" cmpd="sng" algn="ctr">
+                <a:solidFill>
+                  <a:schemeClr val="dk1"/>
+                </a:solidFill>
+                <a:prstDash val="dash"/>
+                <a:round/>
+                <a:headEnd type="none" w="med" len="med"/>
+                <a:tailEnd type="none" w="med" len="med"/>
+              </a:ln>
+            </p:spPr>
+            <p:style>
+              <a:lnRef idx="0">
+                <a:scrgbClr r="0" g="0" b="0"/>
+              </a:lnRef>
+              <a:fillRef idx="0">
+                <a:scrgbClr r="0" g="0" b="0"/>
+              </a:fillRef>
+              <a:effectRef idx="0">
+                <a:scrgbClr r="0" g="0" b="0"/>
+              </a:effectRef>
+              <a:fontRef idx="minor">
+                <a:schemeClr val="tx1"/>
+              </a:fontRef>
+            </p:style>
+          </p:cxnSp>
+          <p:cxnSp>
+            <p:nvCxnSpPr>
+              <p:cNvPr id="30" name="Elbow Connector 29"/>
+              <p:cNvCxnSpPr>
+                <a:stCxn id="11" idx="2"/>
+                <a:endCxn id="22" idx="0"/>
+              </p:cNvCxnSpPr>
+              <p:nvPr/>
+            </p:nvCxnSpPr>
+            <p:spPr>
+              <a:xfrm rot="16200000" flipH="1">
+                <a:off x="4666128" y="2961716"/>
+                <a:ext cx="279028" cy="1516157"/>
+              </a:xfrm>
+              <a:prstGeom prst="bentConnector3">
+                <a:avLst/>
+              </a:prstGeom>
+              <a:ln>
+                <a:tailEnd type="triangle"/>
+              </a:ln>
+            </p:spPr>
+            <p:style>
+              <a:lnRef idx="1">
+                <a:schemeClr val="dk1"/>
+              </a:lnRef>
+              <a:fillRef idx="0">
+                <a:schemeClr val="dk1"/>
+              </a:fillRef>
+              <a:effectRef idx="0">
+                <a:schemeClr val="dk1"/>
+              </a:effectRef>
+              <a:fontRef idx="minor">
+                <a:schemeClr val="tx1"/>
+              </a:fontRef>
+            </p:style>
+          </p:cxnSp>
+          <p:cxnSp>
+            <p:nvCxnSpPr>
+              <p:cNvPr id="32" name="Elbow Connector 31"/>
+              <p:cNvCxnSpPr>
+                <a:stCxn id="14" idx="2"/>
+                <a:endCxn id="22" idx="0"/>
+              </p:cNvCxnSpPr>
+              <p:nvPr/>
+            </p:nvCxnSpPr>
+            <p:spPr>
+              <a:xfrm rot="5400000">
+                <a:off x="6029325" y="3114678"/>
+                <a:ext cx="279028" cy="1210235"/>
+              </a:xfrm>
+              <a:prstGeom prst="bentConnector3">
+                <a:avLst/>
+              </a:prstGeom>
+              <a:ln>
+                <a:tailEnd type="triangle"/>
+              </a:ln>
+            </p:spPr>
+            <p:style>
+              <a:lnRef idx="1">
+                <a:schemeClr val="dk1"/>
+              </a:lnRef>
+              <a:fillRef idx="0">
+                <a:schemeClr val="dk1"/>
+              </a:fillRef>
+              <a:effectRef idx="0">
+                <a:schemeClr val="dk1"/>
+              </a:effectRef>
+              <a:fontRef idx="minor">
+                <a:schemeClr val="tx1"/>
+              </a:fontRef>
+            </p:style>
+          </p:cxnSp>
+          <p:sp>
+            <p:nvSpPr>
+              <p:cNvPr id="33" name="Rounded Rectangle 32"/>
+              <p:cNvSpPr/>
+              <p:nvPr/>
+            </p:nvSpPr>
+            <p:spPr>
+              <a:xfrm>
+                <a:off x="4353488" y="5022480"/>
+                <a:ext cx="2420469" cy="974911"/>
+              </a:xfrm>
+              <a:prstGeom prst="roundRect">
+                <a:avLst/>
+              </a:prstGeom>
+            </p:spPr>
+            <p:style>
+              <a:lnRef idx="2">
+                <a:schemeClr val="accent6"/>
+              </a:lnRef>
+              <a:fillRef idx="1">
+                <a:schemeClr val="lt1"/>
+              </a:fillRef>
+              <a:effectRef idx="0">
+                <a:schemeClr val="accent6"/>
+              </a:effectRef>
+              <a:fontRef idx="minor">
+                <a:schemeClr val="dk1"/>
+              </a:fontRef>
+            </p:style>
+            <p:txBody>
+              <a:bodyPr rtlCol="0" anchor="t"/>
+              <a:lstStyle/>
+              <a:p>
+                <a:r>
+                  <a:rPr lang="en-US" sz="1100" dirty="0" smtClean="0">
+                    <a:latin typeface="Consolas" panose="020B0609020204030204" pitchFamily="49" charset="0"/>
+                    <a:cs typeface="Consolas" panose="020B0609020204030204" pitchFamily="49" charset="0"/>
+                  </a:rPr>
+                  <a:t>{</a:t>
+                </a:r>
+              </a:p>
+              <a:p>
+                <a:r>
+                  <a:rPr lang="en-US" sz="1100" dirty="0" smtClean="0">
+                    <a:latin typeface="Consolas" panose="020B0609020204030204" pitchFamily="49" charset="0"/>
+                    <a:cs typeface="Consolas" panose="020B0609020204030204" pitchFamily="49" charset="0"/>
+                  </a:rPr>
+                  <a:t>“similarity”: 0.35</a:t>
+                </a:r>
+              </a:p>
+              <a:p>
+                <a:r>
+                  <a:rPr lang="en-US" sz="1100" dirty="0" smtClean="0">
+                    <a:latin typeface="Consolas" panose="020B0609020204030204" pitchFamily="49" charset="0"/>
+                    <a:cs typeface="Consolas" panose="020B0609020204030204" pitchFamily="49" charset="0"/>
+                  </a:rPr>
+                  <a:t>“distance”: 0.55</a:t>
+                </a:r>
+              </a:p>
+              <a:p>
+                <a:r>
+                  <a:rPr lang="en-US" sz="1100" dirty="0">
+                    <a:latin typeface="Consolas" panose="020B0609020204030204" pitchFamily="49" charset="0"/>
+                    <a:cs typeface="Consolas" panose="020B0609020204030204" pitchFamily="49" charset="0"/>
+                  </a:rPr>
+                  <a:t>}</a:t>
+                </a:r>
+              </a:p>
+            </p:txBody>
+          </p:sp>
+          <p:cxnSp>
+            <p:nvCxnSpPr>
+              <p:cNvPr id="35" name="Straight Arrow Connector 34"/>
+              <p:cNvCxnSpPr>
+                <a:stCxn id="22" idx="2"/>
+                <a:endCxn id="33" idx="0"/>
+              </p:cNvCxnSpPr>
+              <p:nvPr/>
+            </p:nvCxnSpPr>
+            <p:spPr>
+              <a:xfrm>
+                <a:off x="5563721" y="4733365"/>
+                <a:ext cx="2" cy="289115"/>
+              </a:xfrm>
+              <a:prstGeom prst="straightConnector1">
+                <a:avLst/>
+              </a:prstGeom>
+              <a:ln>
+                <a:tailEnd type="triangle"/>
+              </a:ln>
+            </p:spPr>
+            <p:style>
+              <a:lnRef idx="1">
+                <a:schemeClr val="dk1"/>
+              </a:lnRef>
+              <a:fillRef idx="0">
+                <a:schemeClr val="dk1"/>
+              </a:fillRef>
+              <a:effectRef idx="0">
+                <a:schemeClr val="dk1"/>
+              </a:effectRef>
+              <a:fontRef idx="minor">
+                <a:schemeClr val="tx1"/>
+              </a:fontRef>
+            </p:style>
+          </p:cxnSp>
+        </p:grpSp>
+        <p:sp>
+          <p:nvSpPr>
+            <p:cNvPr id="38" name="Rounded Rectangle 37"/>
+            <p:cNvSpPr/>
+            <p:nvPr/>
+          </p:nvSpPr>
+          <p:spPr>
+            <a:xfrm>
+              <a:off x="3415553" y="776569"/>
+              <a:ext cx="1660715" cy="356347"/>
+            </a:xfrm>
+            <a:prstGeom prst="roundRect">
+              <a:avLst/>
+            </a:prstGeom>
+          </p:spPr>
+          <p:style>
+            <a:lnRef idx="2">
+              <a:schemeClr val="accent6"/>
+            </a:lnRef>
+            <a:fillRef idx="1">
+              <a:schemeClr val="lt1"/>
+            </a:fillRef>
+            <a:effectRef idx="0">
+              <a:schemeClr val="accent6"/>
+            </a:effectRef>
+            <a:fontRef idx="minor">
+              <a:schemeClr val="dk1"/>
+            </a:fontRef>
+          </p:style>
+          <p:txBody>
+            <a:bodyPr rtlCol="0" anchor="ctr"/>
+            <a:lstStyle/>
+            <a:p>
+              <a:pPr algn="ctr"/>
+              <a:r>
+                <a:rPr lang="en-US" sz="1200" dirty="0" err="1" smtClean="0">
+                  <a:latin typeface="Consolas" panose="020B0609020204030204" pitchFamily="49" charset="0"/>
+                  <a:cs typeface="Consolas" panose="020B0609020204030204" pitchFamily="49" charset="0"/>
+                </a:rPr>
+                <a:t>Couchbase</a:t>
+              </a:r>
+              <a:endParaRPr lang="en-US" sz="1200" dirty="0">
+                <a:latin typeface="Consolas" panose="020B0609020204030204" pitchFamily="49" charset="0"/>
+                <a:cs typeface="Consolas" panose="020B0609020204030204" pitchFamily="49" charset="0"/>
+              </a:endParaRPr>
+            </a:p>
+          </p:txBody>
+        </p:sp>
+        <p:sp>
+          <p:nvSpPr>
+            <p:cNvPr id="39" name="Rounded Rectangle 38"/>
+            <p:cNvSpPr/>
+            <p:nvPr/>
+          </p:nvSpPr>
+          <p:spPr>
+            <a:xfrm>
+              <a:off x="5599018" y="776569"/>
+              <a:ext cx="1549771" cy="312643"/>
+            </a:xfrm>
+            <a:prstGeom prst="roundRect">
+              <a:avLst/>
+            </a:prstGeom>
+          </p:spPr>
+          <p:style>
+            <a:lnRef idx="2">
+              <a:schemeClr val="accent6"/>
+            </a:lnRef>
+            <a:fillRef idx="1">
+              <a:schemeClr val="lt1"/>
+            </a:fillRef>
+            <a:effectRef idx="0">
+              <a:schemeClr val="accent6"/>
+            </a:effectRef>
+            <a:fontRef idx="minor">
+              <a:schemeClr val="dk1"/>
+            </a:fontRef>
+          </p:style>
+          <p:txBody>
+            <a:bodyPr rtlCol="0" anchor="ctr"/>
+            <a:lstStyle/>
+            <a:p>
+              <a:pPr algn="ctr"/>
+              <a:r>
+                <a:rPr lang="en-US" sz="1050" dirty="0" err="1" smtClean="0">
+                  <a:latin typeface="Consolas" panose="020B0609020204030204" pitchFamily="49" charset="0"/>
+                  <a:cs typeface="Consolas" panose="020B0609020204030204" pitchFamily="49" charset="0"/>
+                </a:rPr>
+                <a:t>BerkDB</a:t>
+              </a:r>
+              <a:endParaRPr lang="en-US" sz="1100" dirty="0">
+                <a:latin typeface="Consolas" panose="020B0609020204030204" pitchFamily="49" charset="0"/>
+                <a:cs typeface="Consolas" panose="020B0609020204030204" pitchFamily="49" charset="0"/>
+              </a:endParaRPr>
+            </a:p>
+          </p:txBody>
+        </p:sp>
+        <p:sp>
+          <p:nvSpPr>
+            <p:cNvPr id="40" name="Rounded Rectangle 39"/>
+            <p:cNvSpPr/>
+            <p:nvPr/>
+          </p:nvSpPr>
+          <p:spPr>
+            <a:xfrm>
+              <a:off x="4074458" y="1319945"/>
+              <a:ext cx="2299446" cy="487457"/>
+            </a:xfrm>
+            <a:prstGeom prst="roundRect">
+              <a:avLst/>
+            </a:prstGeom>
+          </p:spPr>
+          <p:style>
+            <a:lnRef idx="2">
+              <a:schemeClr val="accent1">
+                <a:shade val="50000"/>
+              </a:schemeClr>
+            </a:lnRef>
+            <a:fillRef idx="1">
+              <a:schemeClr val="accent1"/>
+            </a:fillRef>
+            <a:effectRef idx="0">
+              <a:schemeClr val="accent1"/>
+            </a:effectRef>
+            <a:fontRef idx="minor">
+              <a:schemeClr val="lt1"/>
+            </a:fontRef>
+          </p:style>
+          <p:txBody>
+            <a:bodyPr rtlCol="0" anchor="ctr"/>
+            <a:lstStyle/>
+            <a:p>
+              <a:pPr algn="ctr"/>
+              <a:r>
+                <a:rPr lang="en-US" dirty="0" smtClean="0"/>
+                <a:t>Skill Cleaner</a:t>
+              </a:r>
+            </a:p>
+            <a:p>
+              <a:pPr algn="ctr"/>
+              <a:r>
+                <a:rPr lang="en-US" sz="1200" dirty="0" smtClean="0"/>
+                <a:t>(CONSISTENT CLEANING)</a:t>
+              </a:r>
+              <a:endParaRPr lang="en-US" sz="1200" dirty="0"/>
+            </a:p>
+          </p:txBody>
+        </p:sp>
+        <p:cxnSp>
+          <p:nvCxnSpPr>
+            <p:cNvPr id="42" name="Elbow Connector 41"/>
+            <p:cNvCxnSpPr>
+              <a:stCxn id="38" idx="2"/>
+              <a:endCxn id="40" idx="0"/>
+            </p:cNvCxnSpPr>
+            <p:nvPr/>
+          </p:nvCxnSpPr>
+          <p:spPr>
+            <a:xfrm rot="16200000" flipH="1">
+              <a:off x="4641532" y="737295"/>
+              <a:ext cx="187029" cy="978270"/>
+            </a:xfrm>
+            <a:prstGeom prst="bentConnector3">
+              <a:avLst/>
+            </a:prstGeom>
+            <a:ln>
+              <a:tailEnd type="triangle"/>
+            </a:ln>
+          </p:spPr>
+          <p:style>
+            <a:lnRef idx="1">
+              <a:schemeClr val="dk1"/>
+            </a:lnRef>
+            <a:fillRef idx="0">
+              <a:schemeClr val="dk1"/>
+            </a:fillRef>
+            <a:effectRef idx="0">
+              <a:schemeClr val="dk1"/>
+            </a:effectRef>
+            <a:fontRef idx="minor">
+              <a:schemeClr val="tx1"/>
+            </a:fontRef>
+          </p:style>
+        </p:cxnSp>
+        <p:cxnSp>
+          <p:nvCxnSpPr>
+            <p:cNvPr id="44" name="Elbow Connector 43"/>
+            <p:cNvCxnSpPr>
+              <a:stCxn id="39" idx="2"/>
+              <a:endCxn id="40" idx="0"/>
+            </p:cNvCxnSpPr>
+            <p:nvPr/>
+          </p:nvCxnSpPr>
+          <p:spPr>
+            <a:xfrm rot="5400000">
+              <a:off x="5683677" y="629717"/>
+              <a:ext cx="230733" cy="1149723"/>
+            </a:xfrm>
+            <a:prstGeom prst="bentConnector3">
+              <a:avLst/>
+            </a:prstGeom>
+            <a:ln>
+              <a:tailEnd type="triangle"/>
+            </a:ln>
+          </p:spPr>
+          <p:style>
+            <a:lnRef idx="1">
+              <a:schemeClr val="dk1"/>
+            </a:lnRef>
+            <a:fillRef idx="0">
+              <a:schemeClr val="dk1"/>
+            </a:fillRef>
+            <a:effectRef idx="0">
+              <a:schemeClr val="dk1"/>
+            </a:effectRef>
+            <a:fontRef idx="minor">
+              <a:schemeClr val="tx1"/>
+            </a:fontRef>
+          </p:style>
+        </p:cxnSp>
+        <p:cxnSp>
+          <p:nvCxnSpPr>
+            <p:cNvPr id="46" name="Straight Arrow Connector 45"/>
+            <p:cNvCxnSpPr>
+              <a:stCxn id="40" idx="2"/>
+              <a:endCxn id="5" idx="0"/>
+            </p:cNvCxnSpPr>
+            <p:nvPr/>
+          </p:nvCxnSpPr>
+          <p:spPr>
+            <a:xfrm>
+              <a:off x="5224181" y="1807402"/>
+              <a:ext cx="0" cy="283616"/>
+            </a:xfrm>
+            <a:prstGeom prst="straightConnector1">
+              <a:avLst/>
+            </a:prstGeom>
+            <a:ln>
+              <a:tailEnd type="triangle"/>
+            </a:ln>
+          </p:spPr>
+          <p:style>
+            <a:lnRef idx="1">
+              <a:schemeClr val="dk1"/>
+            </a:lnRef>
+            <a:fillRef idx="0">
+              <a:schemeClr val="dk1"/>
+            </a:fillRef>
+            <a:effectRef idx="0">
+              <a:schemeClr val="dk1"/>
+            </a:effectRef>
+            <a:fontRef idx="minor">
+              <a:schemeClr val="tx1"/>
+            </a:fontRef>
+          </p:style>
+        </p:cxnSp>
+      </p:grpSp>
+      <p:sp>
+        <p:nvSpPr>
+          <p:cNvPr id="48" name="Title 1"/>
+          <p:cNvSpPr>
+            <a:spLocks noGrp="1"/>
+          </p:cNvSpPr>
+          <p:nvPr>
+            <p:ph type="title"/>
+          </p:nvPr>
+        </p:nvSpPr>
+        <p:spPr>
+          <a:xfrm>
+            <a:off x="460000" y="305879"/>
+            <a:ext cx="6033244" cy="363150"/>
+          </a:xfrm>
+        </p:spPr>
+        <p:txBody>
+          <a:bodyPr>
+            <a:noAutofit/>
+          </a:bodyPr>
+          <a:lstStyle/>
+          <a:p>
+            <a:r>
+              <a:rPr lang="en-US" sz="3200" dirty="0" smtClean="0"/>
+              <a:t>Pair-wise similarity score flow</a:t>
+            </a:r>
+            <a:endParaRPr lang="en-US" sz="3200" dirty="0"/>
+          </a:p>
+        </p:txBody>
+      </p:sp>
+    </p:spTree>
+    <p:extLst>
+      <p:ext uri="{BB962C8B-B14F-4D97-AF65-F5344CB8AC3E}">
+        <p14:creationId xmlns:p14="http://schemas.microsoft.com/office/powerpoint/2010/main" val="2033063076"/>
+      </p:ext>
+    </p:extLst>
+  </p:cSld>
+  <p:clrMapOvr>
+    <a:masterClrMapping/>
+  </p:clrMapOvr>
+</p:sld>
+</file>
+
+<file path=ppt/slides/slide56.xml><?xml version="1.0" encoding="utf-8"?>
+<p:sld xmlns:a="http://schemas.openxmlformats.org/drawingml/2006/main" xmlns:r="http://schemas.openxmlformats.org/officeDocument/2006/relationships" xmlns:p="http://schemas.openxmlformats.org/presentationml/2006/main">
+  <p:cSld>
+    <p:spTree>
+      <p:nvGrpSpPr>
+        <p:cNvPr id="1" name=""/>
+        <p:cNvGrpSpPr/>
+        <p:nvPr/>
+      </p:nvGrpSpPr>
+      <p:grpSpPr>
+        <a:xfrm>
+          <a:off x="0" y="0"/>
+          <a:ext cx="0" cy="0"/>
+          <a:chOff x="0" y="0"/>
+          <a:chExt cx="0" cy="0"/>
+        </a:xfrm>
+      </p:grpSpPr>
+      <p:sp>
+        <p:nvSpPr>
+          <p:cNvPr id="2" name="Title 1"/>
+          <p:cNvSpPr>
+            <a:spLocks noGrp="1"/>
+          </p:cNvSpPr>
+          <p:nvPr>
+            <p:ph type="title"/>
+          </p:nvPr>
+        </p:nvSpPr>
+        <p:spPr/>
+        <p:txBody>
+          <a:bodyPr/>
+          <a:lstStyle/>
+          <a:p>
+            <a:r>
+              <a:rPr lang="en-US" dirty="0" smtClean="0"/>
+              <a:t>Working on . . .</a:t>
+            </a:r>
+            <a:endParaRPr lang="en-US" dirty="0"/>
+          </a:p>
+        </p:txBody>
+      </p:sp>
+      <p:sp>
+        <p:nvSpPr>
+          <p:cNvPr id="3" name="Content Placeholder 2"/>
+          <p:cNvSpPr>
+            <a:spLocks noGrp="1"/>
+          </p:cNvSpPr>
+          <p:nvPr>
+            <p:ph idx="1"/>
+          </p:nvPr>
+        </p:nvSpPr>
+        <p:spPr/>
+        <p:txBody>
+          <a:bodyPr/>
+          <a:lstStyle/>
+          <a:p>
+            <a:r>
+              <a:rPr lang="en-US" dirty="0" smtClean="0"/>
+              <a:t>Perform systematic experiments and summarize results.</a:t>
+            </a:r>
+          </a:p>
+          <a:p>
+            <a:r>
+              <a:rPr lang="en-US" dirty="0" smtClean="0"/>
+              <a:t>Consider Including </a:t>
+            </a:r>
+            <a:r>
+              <a:rPr lang="en-US" dirty="0" err="1" smtClean="0"/>
+              <a:t>yago</a:t>
+            </a:r>
+            <a:r>
+              <a:rPr lang="en-US" dirty="0" smtClean="0"/>
+              <a:t> classes while building ontology</a:t>
+            </a:r>
+          </a:p>
+          <a:p>
+            <a:r>
+              <a:rPr lang="en-US" dirty="0" err="1" smtClean="0"/>
+              <a:t>Yago</a:t>
+            </a:r>
+            <a:r>
+              <a:rPr lang="en-US" dirty="0" smtClean="0"/>
+              <a:t> (Yet another great ontology) is a knowledge base which is built by extracting information from Wikipedia, </a:t>
+            </a:r>
+            <a:r>
+              <a:rPr lang="en-US" dirty="0" err="1" smtClean="0"/>
+              <a:t>wordnet</a:t>
+            </a:r>
+            <a:r>
+              <a:rPr lang="en-US" dirty="0" smtClean="0"/>
+              <a:t> etc.</a:t>
+            </a:r>
+          </a:p>
+          <a:p>
+            <a:r>
+              <a:rPr lang="en-US" dirty="0" err="1" smtClean="0"/>
+              <a:t>Dbpedia</a:t>
+            </a:r>
+            <a:r>
+              <a:rPr lang="en-US" dirty="0" smtClean="0"/>
+              <a:t> has linking to </a:t>
+            </a:r>
+            <a:r>
+              <a:rPr lang="en-US" dirty="0" err="1" smtClean="0"/>
+              <a:t>yago</a:t>
+            </a:r>
+            <a:r>
+              <a:rPr lang="en-US" dirty="0" smtClean="0"/>
+              <a:t> classes which are 800,000 classes in total.</a:t>
+            </a:r>
+          </a:p>
+        </p:txBody>
+      </p:sp>
+    </p:spTree>
+    <p:extLst>
+      <p:ext uri="{BB962C8B-B14F-4D97-AF65-F5344CB8AC3E}">
+        <p14:creationId xmlns:p14="http://schemas.microsoft.com/office/powerpoint/2010/main" val="2319139653"/>
+      </p:ext>
+    </p:extLst>
+  </p:cSld>
+  <p:clrMapOvr>
+    <a:masterClrMapping/>
+  </p:clrMapOvr>
+</p:sld>
+</file>
+
+<file path=ppt/slides/slide57.xml><?xml version="1.0" encoding="utf-8"?>
+<p:sld xmlns:a="http://schemas.openxmlformats.org/drawingml/2006/main" xmlns:r="http://schemas.openxmlformats.org/officeDocument/2006/relationships" xmlns:p="http://schemas.openxmlformats.org/presentationml/2006/main">
+  <p:cSld>
+    <p:spTree>
+      <p:nvGrpSpPr>
+        <p:cNvPr id="1" name=""/>
+        <p:cNvGrpSpPr/>
+        <p:nvPr/>
+      </p:nvGrpSpPr>
+      <p:grpSpPr>
+        <a:xfrm>
+          <a:off x="0" y="0"/>
+          <a:ext cx="0" cy="0"/>
+          <a:chOff x="0" y="0"/>
+          <a:chExt cx="0" cy="0"/>
+        </a:xfrm>
+      </p:grpSpPr>
+      <p:sp>
+        <p:nvSpPr>
+          <p:cNvPr id="2" name="Title 1"/>
+          <p:cNvSpPr>
+            <a:spLocks noGrp="1"/>
+          </p:cNvSpPr>
+          <p:nvPr>
+            <p:ph type="title"/>
+          </p:nvPr>
+        </p:nvSpPr>
+        <p:spPr>
+          <a:xfrm>
+            <a:off x="838200" y="365125"/>
+            <a:ext cx="10515600" cy="1127499"/>
+          </a:xfrm>
+        </p:spPr>
+        <p:txBody>
+          <a:bodyPr/>
+          <a:lstStyle/>
+          <a:p>
+            <a:r>
+              <a:rPr lang="en-US" dirty="0" smtClean="0"/>
+              <a:t>Progress</a:t>
+            </a:r>
+            <a:endParaRPr lang="en-US" dirty="0"/>
+          </a:p>
+        </p:txBody>
+      </p:sp>
+      <p:sp>
+        <p:nvSpPr>
+          <p:cNvPr id="3" name="Content Placeholder 2"/>
+          <p:cNvSpPr>
+            <a:spLocks noGrp="1"/>
+          </p:cNvSpPr>
+          <p:nvPr>
+            <p:ph idx="1"/>
+          </p:nvPr>
+        </p:nvSpPr>
+        <p:spPr>
+          <a:xfrm>
+            <a:off x="838200" y="1825625"/>
+            <a:ext cx="10515600" cy="4351338"/>
+          </a:xfrm>
+        </p:spPr>
+        <p:txBody>
+          <a:bodyPr/>
+          <a:lstStyle/>
+          <a:p>
+            <a:r>
+              <a:rPr lang="en-US" dirty="0" smtClean="0"/>
+              <a:t>Included </a:t>
+            </a:r>
+            <a:r>
+              <a:rPr lang="en-US" dirty="0" err="1" smtClean="0"/>
+              <a:t>yago</a:t>
+            </a:r>
+            <a:r>
+              <a:rPr lang="en-US" dirty="0" smtClean="0"/>
+              <a:t> classes in the ontology crawler. </a:t>
+            </a:r>
+          </a:p>
+          <a:p>
+            <a:r>
+              <a:rPr lang="en-US" dirty="0" smtClean="0"/>
+              <a:t>Crawler fetches more useful topics now. But runs for long!</a:t>
+            </a:r>
+          </a:p>
+          <a:p>
+            <a:r>
+              <a:rPr lang="en-US" dirty="0" smtClean="0"/>
+              <a:t>Tried to optimize by parallelizing chunk of work.</a:t>
+            </a:r>
+          </a:p>
+          <a:p>
+            <a:r>
+              <a:rPr lang="en-US" dirty="0" smtClean="0"/>
+              <a:t>Restructured and cleaned up the code and chained the entire workflow together</a:t>
+            </a:r>
+          </a:p>
+          <a:p>
+            <a:r>
+              <a:rPr lang="en-US" dirty="0" smtClean="0"/>
+              <a:t>Ran results for pairwise similarity measures</a:t>
+            </a:r>
+          </a:p>
+          <a:p>
+            <a:endParaRPr lang="en-US" dirty="0" smtClean="0"/>
+          </a:p>
+          <a:p>
+            <a:endParaRPr lang="en-US" dirty="0"/>
+          </a:p>
+        </p:txBody>
+      </p:sp>
+    </p:spTree>
+    <p:extLst>
+      <p:ext uri="{BB962C8B-B14F-4D97-AF65-F5344CB8AC3E}">
+        <p14:creationId xmlns:p14="http://schemas.microsoft.com/office/powerpoint/2010/main" val="2751033267"/>
+      </p:ext>
+    </p:extLst>
+  </p:cSld>
+  <p:clrMapOvr>
+    <a:masterClrMapping/>
+  </p:clrMapOvr>
+  <p:timing>
+    <p:tnLst>
+      <p:par>
+        <p:cTn id="1" dur="indefinite" restart="never" nodeType="tmRoot"/>
+      </p:par>
+    </p:tnLst>
+  </p:timing>
+</p:sld>
+</file>
+
+<file path=ppt/slides/slide58.xml><?xml version="1.0" encoding="utf-8"?>
+<p:sld xmlns:a="http://schemas.openxmlformats.org/drawingml/2006/main" xmlns:r="http://schemas.openxmlformats.org/officeDocument/2006/relationships" xmlns:p="http://schemas.openxmlformats.org/presentationml/2006/main">
+  <p:cSld>
+    <p:spTree>
+      <p:nvGrpSpPr>
+        <p:cNvPr id="1" name=""/>
+        <p:cNvGrpSpPr/>
+        <p:nvPr/>
+      </p:nvGrpSpPr>
+      <p:grpSpPr>
+        <a:xfrm>
+          <a:off x="0" y="0"/>
+          <a:ext cx="0" cy="0"/>
+          <a:chOff x="0" y="0"/>
+          <a:chExt cx="0" cy="0"/>
+        </a:xfrm>
+      </p:grpSpPr>
+      <p:sp>
+        <p:nvSpPr>
+          <p:cNvPr id="2" name="Title 1"/>
+          <p:cNvSpPr>
+            <a:spLocks noGrp="1"/>
+          </p:cNvSpPr>
+          <p:nvPr>
+            <p:ph type="title"/>
+          </p:nvPr>
+        </p:nvSpPr>
+        <p:spPr>
+          <a:xfrm>
+            <a:off x="838200" y="365126"/>
+            <a:ext cx="10403541" cy="616510"/>
+          </a:xfrm>
+        </p:spPr>
+        <p:txBody>
+          <a:bodyPr>
+            <a:normAutofit/>
+          </a:bodyPr>
+          <a:lstStyle/>
+          <a:p>
+            <a:r>
+              <a:rPr lang="en-US" sz="3200" dirty="0" smtClean="0"/>
+              <a:t>Skill Similarity – Top programming skills	</a:t>
+            </a:r>
+            <a:endParaRPr lang="en-US" sz="3200" dirty="0"/>
+          </a:p>
+        </p:txBody>
+      </p:sp>
+      <p:pic>
+        <p:nvPicPr>
+          <p:cNvPr id="4" name="Picture 3"/>
+          <p:cNvPicPr>
+            <a:picLocks noChangeAspect="1"/>
+          </p:cNvPicPr>
+          <p:nvPr/>
+        </p:nvPicPr>
+        <p:blipFill>
+          <a:blip r:embed="rId2">
+            <a:extLst>
+              <a:ext uri="{28A0092B-C50C-407E-A947-70E740481C1C}">
+                <a14:useLocalDpi xmlns:a14="http://schemas.microsoft.com/office/drawing/2010/main" val="0"/>
+              </a:ext>
+            </a:extLst>
+          </a:blip>
+          <a:stretch>
+            <a:fillRect/>
+          </a:stretch>
+        </p:blipFill>
+        <p:spPr>
+          <a:xfrm>
+            <a:off x="1477346" y="981636"/>
+            <a:ext cx="6752253" cy="6008982"/>
+          </a:xfrm>
+          <a:prstGeom prst="rect">
+            <a:avLst/>
+          </a:prstGeom>
+        </p:spPr>
+      </p:pic>
+      <p:sp>
+        <p:nvSpPr>
+          <p:cNvPr id="5" name="TextBox 4"/>
+          <p:cNvSpPr txBox="1"/>
+          <p:nvPr/>
+        </p:nvSpPr>
+        <p:spPr>
+          <a:xfrm>
+            <a:off x="8538882" y="1290918"/>
+            <a:ext cx="2985247" cy="4524315"/>
+          </a:xfrm>
+          <a:prstGeom prst="rect">
+            <a:avLst/>
+          </a:prstGeom>
+          <a:noFill/>
+        </p:spPr>
+        <p:txBody>
+          <a:bodyPr wrap="square" rtlCol="0">
+            <a:spAutoFit/>
+          </a:bodyPr>
+          <a:lstStyle/>
+          <a:p>
+            <a:pPr marL="285750" indent="-285750">
+              <a:buFont typeface="Arial" panose="020B0604020202020204" pitchFamily="34" charset="0"/>
+              <a:buChar char="•"/>
+            </a:pPr>
+            <a:r>
+              <a:rPr lang="en-US" dirty="0" smtClean="0"/>
+              <a:t>Most of the similarities are expected</a:t>
+            </a:r>
+          </a:p>
+          <a:p>
+            <a:pPr marL="285750" indent="-285750">
+              <a:buFont typeface="Arial" panose="020B0604020202020204" pitchFamily="34" charset="0"/>
+              <a:buChar char="•"/>
+            </a:pPr>
+            <a:r>
+              <a:rPr lang="en-US" dirty="0" smtClean="0"/>
+              <a:t>Few similarities are unexpected from a technology skill standpoint. </a:t>
+            </a:r>
+            <a:r>
+              <a:rPr lang="en-US" dirty="0" err="1" smtClean="0"/>
+              <a:t>Eg</a:t>
+            </a:r>
+            <a:r>
+              <a:rPr lang="en-US" dirty="0" smtClean="0"/>
+              <a:t> : Spring, Django and Express have considerable similarity from a web framework perspective. But they are very different skills from a technical perspective. Another example is Python and </a:t>
+            </a:r>
+            <a:r>
+              <a:rPr lang="en-US" dirty="0" err="1" smtClean="0"/>
+              <a:t>Javascript</a:t>
+            </a:r>
+            <a:r>
+              <a:rPr lang="en-US" dirty="0"/>
+              <a:t>.</a:t>
+            </a:r>
+            <a:endParaRPr lang="en-US" dirty="0" smtClean="0"/>
+          </a:p>
+          <a:p>
+            <a:pPr marL="285750" indent="-285750">
+              <a:buFont typeface="Arial" panose="020B0604020202020204" pitchFamily="34" charset="0"/>
+              <a:buChar char="•"/>
+            </a:pPr>
+            <a:r>
+              <a:rPr lang="en-US" dirty="0" smtClean="0"/>
+              <a:t>Few misses – Swift and IOS</a:t>
+            </a:r>
+          </a:p>
+          <a:p>
+            <a:pPr marL="285750" indent="-285750">
+              <a:buFont typeface="Arial" panose="020B0604020202020204" pitchFamily="34" charset="0"/>
+              <a:buChar char="•"/>
+            </a:pPr>
+            <a:endParaRPr lang="en-US" dirty="0" smtClean="0"/>
+          </a:p>
+        </p:txBody>
+      </p:sp>
+    </p:spTree>
+    <p:extLst>
+      <p:ext uri="{BB962C8B-B14F-4D97-AF65-F5344CB8AC3E}">
+        <p14:creationId xmlns:p14="http://schemas.microsoft.com/office/powerpoint/2010/main" val="563996787"/>
+      </p:ext>
+    </p:extLst>
+  </p:cSld>
+  <p:clrMapOvr>
+    <a:masterClrMapping/>
+  </p:clrMapOvr>
+  <p:timing>
+    <p:tnLst>
+      <p:par>
+        <p:cTn id="1" dur="indefinite" restart="never" nodeType="tmRoot"/>
+      </p:par>
+    </p:tnLst>
+  </p:timing>
+</p:sld>
+</file>
+
+<file path=ppt/slides/slide59.xml><?xml version="1.0" encoding="utf-8"?>
+<p:sld xmlns:a="http://schemas.openxmlformats.org/drawingml/2006/main" xmlns:r="http://schemas.openxmlformats.org/officeDocument/2006/relationships" xmlns:p="http://schemas.openxmlformats.org/presentationml/2006/main">
+  <p:cSld>
+    <p:spTree>
+      <p:nvGrpSpPr>
+        <p:cNvPr id="1" name=""/>
+        <p:cNvGrpSpPr/>
+        <p:nvPr/>
+      </p:nvGrpSpPr>
+      <p:grpSpPr>
+        <a:xfrm>
+          <a:off x="0" y="0"/>
+          <a:ext cx="0" cy="0"/>
+          <a:chOff x="0" y="0"/>
+          <a:chExt cx="0" cy="0"/>
+        </a:xfrm>
+      </p:grpSpPr>
+      <p:sp>
+        <p:nvSpPr>
+          <p:cNvPr id="2" name="Title 1"/>
+          <p:cNvSpPr>
+            <a:spLocks noGrp="1"/>
+          </p:cNvSpPr>
+          <p:nvPr>
+            <p:ph type="title"/>
+          </p:nvPr>
+        </p:nvSpPr>
+        <p:spPr>
+          <a:xfrm>
+            <a:off x="838200" y="365126"/>
+            <a:ext cx="10403541" cy="616510"/>
+          </a:xfrm>
+        </p:spPr>
+        <p:txBody>
+          <a:bodyPr>
+            <a:normAutofit/>
+          </a:bodyPr>
+          <a:lstStyle/>
+          <a:p>
+            <a:r>
+              <a:rPr lang="en-US" sz="3200" dirty="0" smtClean="0"/>
+              <a:t>Skill Similarity – Top Big data skills	</a:t>
+            </a:r>
+            <a:endParaRPr lang="en-US" sz="3200" dirty="0"/>
+          </a:p>
+        </p:txBody>
+      </p:sp>
+      <p:pic>
+        <p:nvPicPr>
+          <p:cNvPr id="3" name="Picture 2"/>
+          <p:cNvPicPr>
+            <a:picLocks noChangeAspect="1"/>
+          </p:cNvPicPr>
+          <p:nvPr/>
+        </p:nvPicPr>
+        <p:blipFill>
+          <a:blip r:embed="rId2">
+            <a:extLst>
+              <a:ext uri="{28A0092B-C50C-407E-A947-70E740481C1C}">
+                <a14:useLocalDpi xmlns:a14="http://schemas.microsoft.com/office/drawing/2010/main" val="0"/>
+              </a:ext>
+            </a:extLst>
+          </a:blip>
+          <a:stretch>
+            <a:fillRect/>
+          </a:stretch>
+        </p:blipFill>
+        <p:spPr>
+          <a:xfrm>
+            <a:off x="4213435" y="981636"/>
+            <a:ext cx="7028306" cy="6252883"/>
+          </a:xfrm>
+          <a:prstGeom prst="rect">
+            <a:avLst/>
+          </a:prstGeom>
+        </p:spPr>
+      </p:pic>
+      <p:sp>
+        <p:nvSpPr>
+          <p:cNvPr id="6" name="TextBox 5"/>
+          <p:cNvSpPr txBox="1"/>
+          <p:nvPr/>
+        </p:nvSpPr>
+        <p:spPr>
+          <a:xfrm>
+            <a:off x="699247" y="1438836"/>
+            <a:ext cx="3133165" cy="3693319"/>
+          </a:xfrm>
+          <a:prstGeom prst="rect">
+            <a:avLst/>
+          </a:prstGeom>
+          <a:noFill/>
+        </p:spPr>
+        <p:txBody>
+          <a:bodyPr wrap="square" rtlCol="0">
+            <a:spAutoFit/>
+          </a:bodyPr>
+          <a:lstStyle/>
+          <a:p>
+            <a:pPr marL="285750" indent="-285750">
+              <a:buFont typeface="Arial" panose="020B0604020202020204" pitchFamily="34" charset="0"/>
+              <a:buChar char="•"/>
+            </a:pPr>
+            <a:r>
+              <a:rPr lang="en-US" dirty="0" smtClean="0"/>
+              <a:t>More unexpected similarities </a:t>
+            </a:r>
+          </a:p>
+          <a:p>
+            <a:pPr marL="742950" lvl="1" indent="-285750">
+              <a:buFont typeface="Arial" panose="020B0604020202020204" pitchFamily="34" charset="0"/>
+              <a:buChar char="•"/>
+            </a:pPr>
+            <a:r>
+              <a:rPr lang="en-US" dirty="0" smtClean="0"/>
+              <a:t>Apache </a:t>
+            </a:r>
+            <a:r>
+              <a:rPr lang="en-US" dirty="0" err="1" smtClean="0"/>
+              <a:t>Solr</a:t>
+            </a:r>
+            <a:r>
+              <a:rPr lang="en-US" dirty="0"/>
+              <a:t> </a:t>
+            </a:r>
+            <a:r>
+              <a:rPr lang="en-US" dirty="0" smtClean="0"/>
+              <a:t>– MongoDB - </a:t>
+            </a:r>
+            <a:r>
+              <a:rPr lang="en-US" dirty="0" err="1" smtClean="0"/>
+              <a:t>CouchBase</a:t>
+            </a:r>
+            <a:endParaRPr lang="en-US" dirty="0" smtClean="0"/>
+          </a:p>
+          <a:p>
+            <a:pPr marL="285750" indent="-285750">
+              <a:buFont typeface="Arial" panose="020B0604020202020204" pitchFamily="34" charset="0"/>
+              <a:buChar char="•"/>
+            </a:pPr>
+            <a:r>
+              <a:rPr lang="en-US" dirty="0" smtClean="0"/>
+              <a:t>Misses – </a:t>
+            </a:r>
+            <a:r>
+              <a:rPr lang="en-US" dirty="0" err="1" smtClean="0"/>
+              <a:t>Lucene</a:t>
+            </a:r>
+            <a:r>
+              <a:rPr lang="en-US" dirty="0" smtClean="0"/>
+              <a:t>, </a:t>
+            </a:r>
+            <a:r>
+              <a:rPr lang="en-US" dirty="0" err="1" smtClean="0"/>
+              <a:t>Elasticsearch</a:t>
+            </a:r>
+            <a:endParaRPr lang="en-US" dirty="0" smtClean="0"/>
+          </a:p>
+          <a:p>
+            <a:pPr marL="285750" indent="-285750">
+              <a:buFont typeface="Arial" panose="020B0604020202020204" pitchFamily="34" charset="0"/>
+              <a:buChar char="•"/>
+            </a:pPr>
+            <a:endParaRPr lang="en-US" dirty="0"/>
+          </a:p>
+          <a:p>
+            <a:pPr marL="285750" indent="-285750">
+              <a:buFont typeface="Arial" panose="020B0604020202020204" pitchFamily="34" charset="0"/>
+              <a:buChar char="•"/>
+            </a:pPr>
+            <a:r>
+              <a:rPr lang="en-US" dirty="0" smtClean="0"/>
+              <a:t>Reason : Possibly, the ontology subgraph is not broad. Crawling was started form more specialized root nodes.</a:t>
+            </a:r>
+          </a:p>
+          <a:p>
+            <a:pPr marL="285750" indent="-285750">
+              <a:buFont typeface="Arial" panose="020B0604020202020204" pitchFamily="34" charset="0"/>
+              <a:buChar char="•"/>
+            </a:pPr>
+            <a:endParaRPr lang="en-US" dirty="0" smtClean="0"/>
+          </a:p>
+        </p:txBody>
+      </p:sp>
+    </p:spTree>
+    <p:extLst>
+      <p:ext uri="{BB962C8B-B14F-4D97-AF65-F5344CB8AC3E}">
+        <p14:creationId xmlns:p14="http://schemas.microsoft.com/office/powerpoint/2010/main" val="2933795903"/>
+      </p:ext>
+    </p:extLst>
+  </p:cSld>
+  <p:clrMapOvr>
+    <a:masterClrMapping/>
+  </p:clrMapOvr>
+  <p:timing>
+    <p:tnLst>
+      <p:par>
+        <p:cTn id="1" dur="indefinite" restart="never" nodeType="tmRoot"/>
+      </p:par>
+    </p:tnLst>
+  </p:timing>
+</p:sld>
+</file>
+
 <file path=ppt/slides/slide6.xml><?xml version="1.0" encoding="utf-8"?>
 <p:sld xmlns:a="http://schemas.openxmlformats.org/drawingml/2006/main" xmlns:r="http://schemas.openxmlformats.org/officeDocument/2006/relationships" xmlns:p="http://schemas.openxmlformats.org/presentationml/2006/main">
   <p:cSld>
@@ -16372,6 +18415,106 @@
   <p:clrMapOvr>
     <a:masterClrMapping/>
   </p:clrMapOvr>
+</p:sld>
+</file>
+
+<file path=ppt/slides/slide60.xml><?xml version="1.0" encoding="utf-8"?>
+<p:sld xmlns:a="http://schemas.openxmlformats.org/drawingml/2006/main" xmlns:r="http://schemas.openxmlformats.org/officeDocument/2006/relationships" xmlns:p="http://schemas.openxmlformats.org/presentationml/2006/main">
+  <p:cSld>
+    <p:spTree>
+      <p:nvGrpSpPr>
+        <p:cNvPr id="1" name=""/>
+        <p:cNvGrpSpPr/>
+        <p:nvPr/>
+      </p:nvGrpSpPr>
+      <p:grpSpPr>
+        <a:xfrm>
+          <a:off x="0" y="0"/>
+          <a:ext cx="0" cy="0"/>
+          <a:chOff x="0" y="0"/>
+          <a:chExt cx="0" cy="0"/>
+        </a:xfrm>
+      </p:grpSpPr>
+      <p:sp>
+        <p:nvSpPr>
+          <p:cNvPr id="2" name="Title 1"/>
+          <p:cNvSpPr>
+            <a:spLocks noGrp="1"/>
+          </p:cNvSpPr>
+          <p:nvPr>
+            <p:ph type="title"/>
+          </p:nvPr>
+        </p:nvSpPr>
+        <p:spPr/>
+        <p:txBody>
+          <a:bodyPr/>
+          <a:lstStyle/>
+          <a:p>
+            <a:r>
+              <a:rPr lang="en-US" dirty="0" smtClean="0"/>
+              <a:t>Problems/Confusions</a:t>
+            </a:r>
+            <a:endParaRPr lang="en-US" dirty="0"/>
+          </a:p>
+        </p:txBody>
+      </p:sp>
+      <p:sp>
+        <p:nvSpPr>
+          <p:cNvPr id="3" name="Content Placeholder 2"/>
+          <p:cNvSpPr>
+            <a:spLocks noGrp="1"/>
+          </p:cNvSpPr>
+          <p:nvPr>
+            <p:ph idx="1"/>
+          </p:nvPr>
+        </p:nvSpPr>
+        <p:spPr/>
+        <p:txBody>
+          <a:bodyPr/>
+          <a:lstStyle/>
+          <a:p>
+            <a:r>
+              <a:rPr lang="en-US" dirty="0" smtClean="0"/>
+              <a:t>How to compare and quantify the performance of the skill similarity.</a:t>
+            </a:r>
+          </a:p>
+          <a:p>
+            <a:r>
+              <a:rPr lang="en-US" dirty="0" smtClean="0"/>
+              <a:t>Looking for similar papers to compare results</a:t>
+            </a:r>
+          </a:p>
+          <a:p>
+            <a:r>
+              <a:rPr lang="en-US" dirty="0" smtClean="0"/>
+              <a:t>Should I embed this into a overall recommendation strategy and compare the overall recommendation score?</a:t>
+            </a:r>
+          </a:p>
+          <a:p>
+            <a:pPr marL="0" indent="0">
+              <a:buNone/>
+            </a:pPr>
+            <a:endParaRPr lang="en-US" dirty="0"/>
+          </a:p>
+        </p:txBody>
+      </p:sp>
+    </p:spTree>
+    <p:extLst>
+      <p:ext uri="{BB962C8B-B14F-4D97-AF65-F5344CB8AC3E}">
+        <p14:creationId xmlns:p14="http://schemas.microsoft.com/office/powerpoint/2010/main" val="581907534"/>
+      </p:ext>
+    </p:extLst>
+  </p:cSld>
+  <p:clrMapOvr>
+    <a:masterClrMapping/>
+  </p:clrMapOvr>
+  <p:timing>
+    <p:tnLst>
+      <p:par>
+        <p:cTn id="1" dur="indefinite" restart="never" nodeType="tmRoot"/>
+      </p:par>
+    </p:tnLst>
+  </p:timing>
 </p:sld>
 </file>
 

</xml_diff>